<commit_message>
TRACK-2 add new field
</commit_message>
<xml_diff>
--- a/img/MessageService.pptx
+++ b/img/MessageService.pptx
@@ -5,13 +5,14 @@
     <p:sldMasterId id="2147483648" r:id="rId1"/>
   </p:sldMasterIdLst>
   <p:notesMasterIdLst>
-    <p:notesMasterId r:id="rId6"/>
+    <p:notesMasterId r:id="rId7"/>
   </p:notesMasterIdLst>
   <p:sldIdLst>
     <p:sldId id="256" r:id="rId2"/>
     <p:sldId id="257" r:id="rId3"/>
     <p:sldId id="258" r:id="rId4"/>
     <p:sldId id="259" r:id="rId5"/>
+    <p:sldId id="260" r:id="rId6"/>
   </p:sldIdLst>
   <p:sldSz cx="12192000" cy="6858000"/>
   <p:notesSz cx="6858000" cy="9144000"/>
@@ -691,7 +692,7 @@
           <a:p>
             <a:fld id="{FB49B6D9-76A2-4273-8898-41BA7861568C}" type="datetimeFigureOut">
               <a:rPr lang="en-US" smtClean="0"/>
-              <a:t>6/1/2025</a:t>
+              <a:t>6/5/2025</a:t>
             </a:fld>
             <a:endParaRPr lang="en-US"/>
           </a:p>
@@ -1189,7 +1190,7 @@
           <a:p>
             <a:fld id="{F06B3324-A130-486E-B399-F13CFE9C01D2}" type="datetimeFigureOut">
               <a:rPr lang="en-US" smtClean="0"/>
-              <a:t>6/1/2025</a:t>
+              <a:t>6/5/2025</a:t>
             </a:fld>
             <a:endParaRPr lang="en-US"/>
           </a:p>
@@ -1387,7 +1388,7 @@
           <a:p>
             <a:fld id="{F06B3324-A130-486E-B399-F13CFE9C01D2}" type="datetimeFigureOut">
               <a:rPr lang="en-US" smtClean="0"/>
-              <a:t>6/1/2025</a:t>
+              <a:t>6/5/2025</a:t>
             </a:fld>
             <a:endParaRPr lang="en-US"/>
           </a:p>
@@ -1595,7 +1596,7 @@
           <a:p>
             <a:fld id="{F06B3324-A130-486E-B399-F13CFE9C01D2}" type="datetimeFigureOut">
               <a:rPr lang="en-US" smtClean="0"/>
-              <a:t>6/1/2025</a:t>
+              <a:t>6/5/2025</a:t>
             </a:fld>
             <a:endParaRPr lang="en-US"/>
           </a:p>
@@ -1793,7 +1794,7 @@
           <a:p>
             <a:fld id="{F06B3324-A130-486E-B399-F13CFE9C01D2}" type="datetimeFigureOut">
               <a:rPr lang="en-US" smtClean="0"/>
-              <a:t>6/1/2025</a:t>
+              <a:t>6/5/2025</a:t>
             </a:fld>
             <a:endParaRPr lang="en-US"/>
           </a:p>
@@ -2068,7 +2069,7 @@
           <a:p>
             <a:fld id="{F06B3324-A130-486E-B399-F13CFE9C01D2}" type="datetimeFigureOut">
               <a:rPr lang="en-US" smtClean="0"/>
-              <a:t>6/1/2025</a:t>
+              <a:t>6/5/2025</a:t>
             </a:fld>
             <a:endParaRPr lang="en-US"/>
           </a:p>
@@ -2333,7 +2334,7 @@
           <a:p>
             <a:fld id="{F06B3324-A130-486E-B399-F13CFE9C01D2}" type="datetimeFigureOut">
               <a:rPr lang="en-US" smtClean="0"/>
-              <a:t>6/1/2025</a:t>
+              <a:t>6/5/2025</a:t>
             </a:fld>
             <a:endParaRPr lang="en-US"/>
           </a:p>
@@ -2745,7 +2746,7 @@
           <a:p>
             <a:fld id="{F06B3324-A130-486E-B399-F13CFE9C01D2}" type="datetimeFigureOut">
               <a:rPr lang="en-US" smtClean="0"/>
-              <a:t>6/1/2025</a:t>
+              <a:t>6/5/2025</a:t>
             </a:fld>
             <a:endParaRPr lang="en-US"/>
           </a:p>
@@ -2886,7 +2887,7 @@
           <a:p>
             <a:fld id="{F06B3324-A130-486E-B399-F13CFE9C01D2}" type="datetimeFigureOut">
               <a:rPr lang="en-US" smtClean="0"/>
-              <a:t>6/1/2025</a:t>
+              <a:t>6/5/2025</a:t>
             </a:fld>
             <a:endParaRPr lang="en-US"/>
           </a:p>
@@ -2999,7 +3000,7 @@
           <a:p>
             <a:fld id="{F06B3324-A130-486E-B399-F13CFE9C01D2}" type="datetimeFigureOut">
               <a:rPr lang="en-US" smtClean="0"/>
-              <a:t>6/1/2025</a:t>
+              <a:t>6/5/2025</a:t>
             </a:fld>
             <a:endParaRPr lang="en-US"/>
           </a:p>
@@ -3310,7 +3311,7 @@
           <a:p>
             <a:fld id="{F06B3324-A130-486E-B399-F13CFE9C01D2}" type="datetimeFigureOut">
               <a:rPr lang="en-US" smtClean="0"/>
-              <a:t>6/1/2025</a:t>
+              <a:t>6/5/2025</a:t>
             </a:fld>
             <a:endParaRPr lang="en-US"/>
           </a:p>
@@ -3598,7 +3599,7 @@
           <a:p>
             <a:fld id="{F06B3324-A130-486E-B399-F13CFE9C01D2}" type="datetimeFigureOut">
               <a:rPr lang="en-US" smtClean="0"/>
-              <a:t>6/1/2025</a:t>
+              <a:t>6/5/2025</a:t>
             </a:fld>
             <a:endParaRPr lang="en-US"/>
           </a:p>
@@ -3839,7 +3840,7 @@
           <a:p>
             <a:fld id="{F06B3324-A130-486E-B399-F13CFE9C01D2}" type="datetimeFigureOut">
               <a:rPr lang="en-US" smtClean="0"/>
-              <a:t>6/1/2025</a:t>
+              <a:t>6/5/2025</a:t>
             </a:fld>
             <a:endParaRPr lang="en-US"/>
           </a:p>
@@ -6054,6 +6055,41 @@
           </a:p>
         </p:txBody>
       </p:sp>
+      <p:sp>
+        <p:nvSpPr>
+          <p:cNvPr id="2" name="TextBox 1">
+            <a:extLst>
+              <a:ext uri="{FF2B5EF4-FFF2-40B4-BE49-F238E27FC236}">
+                <a16:creationId xmlns:a16="http://schemas.microsoft.com/office/drawing/2014/main" id="{F7E2BA87-4A9D-7D7D-55D1-8873356FE7C7}"/>
+              </a:ext>
+            </a:extLst>
+          </p:cNvPr>
+          <p:cNvSpPr txBox="1"/>
+          <p:nvPr/>
+        </p:nvSpPr>
+        <p:spPr>
+          <a:xfrm>
+            <a:off x="5213066" y="5684363"/>
+            <a:ext cx="1765868" cy="369332"/>
+          </a:xfrm>
+          <a:prstGeom prst="rect">
+            <a:avLst/>
+          </a:prstGeom>
+          <a:noFill/>
+        </p:spPr>
+        <p:txBody>
+          <a:bodyPr wrap="none" rtlCol="0">
+            <a:spAutoFit/>
+          </a:bodyPr>
+          <a:lstStyle/>
+          <a:p>
+            <a:r>
+              <a:rPr lang="en-US" dirty="0"/>
+              <a:t>Workflow simple</a:t>
+            </a:r>
+          </a:p>
+        </p:txBody>
+      </p:sp>
     </p:spTree>
     <p:extLst>
       <p:ext uri="{BB962C8B-B14F-4D97-AF65-F5344CB8AC3E}">
@@ -7833,10 +7869,2460 @@
           <a:chExt cx="0" cy="0"/>
         </a:xfrm>
       </p:grpSpPr>
+      <p:sp>
+        <p:nvSpPr>
+          <p:cNvPr id="2" name="Rectangle 1">
+            <a:extLst>
+              <a:ext uri="{FF2B5EF4-FFF2-40B4-BE49-F238E27FC236}">
+                <a16:creationId xmlns:a16="http://schemas.microsoft.com/office/drawing/2014/main" id="{B3E35AFE-8230-D9BC-3573-49EE37343238}"/>
+              </a:ext>
+            </a:extLst>
+          </p:cNvPr>
+          <p:cNvSpPr/>
+          <p:nvPr/>
+        </p:nvSpPr>
+        <p:spPr>
+          <a:xfrm>
+            <a:off x="6150456" y="3077547"/>
+            <a:ext cx="1329180" cy="556181"/>
+          </a:xfrm>
+          <a:prstGeom prst="rect">
+            <a:avLst/>
+          </a:prstGeom>
+        </p:spPr>
+        <p:style>
+          <a:lnRef idx="2">
+            <a:schemeClr val="dk1"/>
+          </a:lnRef>
+          <a:fillRef idx="1">
+            <a:schemeClr val="lt1"/>
+          </a:fillRef>
+          <a:effectRef idx="0">
+            <a:schemeClr val="dk1"/>
+          </a:effectRef>
+          <a:fontRef idx="minor">
+            <a:schemeClr val="dk1"/>
+          </a:fontRef>
+        </p:style>
+        <p:txBody>
+          <a:bodyPr rtlCol="0" anchor="ctr"/>
+          <a:lstStyle/>
+          <a:p>
+            <a:pPr algn="ctr"/>
+            <a:r>
+              <a:rPr lang="en-US" sz="1600" dirty="0"/>
+              <a:t>Message service</a:t>
+            </a:r>
+          </a:p>
+        </p:txBody>
+      </p:sp>
+      <p:sp>
+        <p:nvSpPr>
+          <p:cNvPr id="5" name="Oval 4">
+            <a:extLst>
+              <a:ext uri="{FF2B5EF4-FFF2-40B4-BE49-F238E27FC236}">
+                <a16:creationId xmlns:a16="http://schemas.microsoft.com/office/drawing/2014/main" id="{AAB7F72D-956E-2871-05AB-1FEEFEE2D737}"/>
+              </a:ext>
+            </a:extLst>
+          </p:cNvPr>
+          <p:cNvSpPr/>
+          <p:nvPr/>
+        </p:nvSpPr>
+        <p:spPr>
+          <a:xfrm>
+            <a:off x="4433499" y="1022812"/>
+            <a:ext cx="282804" cy="292231"/>
+          </a:xfrm>
+          <a:prstGeom prst="ellipse">
+            <a:avLst/>
+          </a:prstGeom>
+        </p:spPr>
+        <p:style>
+          <a:lnRef idx="2">
+            <a:schemeClr val="accent1">
+              <a:shade val="15000"/>
+            </a:schemeClr>
+          </a:lnRef>
+          <a:fillRef idx="1">
+            <a:schemeClr val="accent1"/>
+          </a:fillRef>
+          <a:effectRef idx="0">
+            <a:schemeClr val="accent1"/>
+          </a:effectRef>
+          <a:fontRef idx="minor">
+            <a:schemeClr val="lt1"/>
+          </a:fontRef>
+        </p:style>
+        <p:txBody>
+          <a:bodyPr rtlCol="0" anchor="ctr"/>
+          <a:lstStyle/>
+          <a:p>
+            <a:pPr algn="ctr"/>
+            <a:endParaRPr lang="en-US"/>
+          </a:p>
+        </p:txBody>
+      </p:sp>
+      <p:cxnSp>
+        <p:nvCxnSpPr>
+          <p:cNvPr id="6" name="Straight Connector 5">
+            <a:extLst>
+              <a:ext uri="{FF2B5EF4-FFF2-40B4-BE49-F238E27FC236}">
+                <a16:creationId xmlns:a16="http://schemas.microsoft.com/office/drawing/2014/main" id="{35F41692-E0B0-EB11-065D-2790D67DCEC5}"/>
+              </a:ext>
+            </a:extLst>
+          </p:cNvPr>
+          <p:cNvCxnSpPr>
+            <a:cxnSpLocks/>
+            <a:stCxn id="5" idx="4"/>
+          </p:cNvCxnSpPr>
+          <p:nvPr/>
+        </p:nvCxnSpPr>
+        <p:spPr>
+          <a:xfrm>
+            <a:off x="4574901" y="1315043"/>
+            <a:ext cx="0" cy="499621"/>
+          </a:xfrm>
+          <a:prstGeom prst="line">
+            <a:avLst/>
+          </a:prstGeom>
+        </p:spPr>
+        <p:style>
+          <a:lnRef idx="3">
+            <a:schemeClr val="accent1"/>
+          </a:lnRef>
+          <a:fillRef idx="0">
+            <a:schemeClr val="accent1"/>
+          </a:fillRef>
+          <a:effectRef idx="2">
+            <a:schemeClr val="accent1"/>
+          </a:effectRef>
+          <a:fontRef idx="minor">
+            <a:schemeClr val="tx1"/>
+          </a:fontRef>
+        </p:style>
+      </p:cxnSp>
+      <p:cxnSp>
+        <p:nvCxnSpPr>
+          <p:cNvPr id="7" name="Straight Connector 6">
+            <a:extLst>
+              <a:ext uri="{FF2B5EF4-FFF2-40B4-BE49-F238E27FC236}">
+                <a16:creationId xmlns:a16="http://schemas.microsoft.com/office/drawing/2014/main" id="{9F8274D2-6154-07F7-BAE1-C77B5E71E9A0}"/>
+              </a:ext>
+            </a:extLst>
+          </p:cNvPr>
+          <p:cNvCxnSpPr>
+            <a:cxnSpLocks/>
+          </p:cNvCxnSpPr>
+          <p:nvPr/>
+        </p:nvCxnSpPr>
+        <p:spPr>
+          <a:xfrm flipH="1">
+            <a:off x="4433499" y="1814664"/>
+            <a:ext cx="141402" cy="188536"/>
+          </a:xfrm>
+          <a:prstGeom prst="line">
+            <a:avLst/>
+          </a:prstGeom>
+        </p:spPr>
+        <p:style>
+          <a:lnRef idx="3">
+            <a:schemeClr val="accent1"/>
+          </a:lnRef>
+          <a:fillRef idx="0">
+            <a:schemeClr val="accent1"/>
+          </a:fillRef>
+          <a:effectRef idx="2">
+            <a:schemeClr val="accent1"/>
+          </a:effectRef>
+          <a:fontRef idx="minor">
+            <a:schemeClr val="tx1"/>
+          </a:fontRef>
+        </p:style>
+      </p:cxnSp>
+      <p:cxnSp>
+        <p:nvCxnSpPr>
+          <p:cNvPr id="8" name="Straight Connector 7">
+            <a:extLst>
+              <a:ext uri="{FF2B5EF4-FFF2-40B4-BE49-F238E27FC236}">
+                <a16:creationId xmlns:a16="http://schemas.microsoft.com/office/drawing/2014/main" id="{CCB3D871-FD42-2AB0-637E-1877DA21454D}"/>
+              </a:ext>
+            </a:extLst>
+          </p:cNvPr>
+          <p:cNvCxnSpPr>
+            <a:cxnSpLocks/>
+          </p:cNvCxnSpPr>
+          <p:nvPr/>
+        </p:nvCxnSpPr>
+        <p:spPr>
+          <a:xfrm flipH="1" flipV="1">
+            <a:off x="4574901" y="1814664"/>
+            <a:ext cx="152399" cy="188536"/>
+          </a:xfrm>
+          <a:prstGeom prst="line">
+            <a:avLst/>
+          </a:prstGeom>
+        </p:spPr>
+        <p:style>
+          <a:lnRef idx="3">
+            <a:schemeClr val="accent1"/>
+          </a:lnRef>
+          <a:fillRef idx="0">
+            <a:schemeClr val="accent1"/>
+          </a:fillRef>
+          <a:effectRef idx="2">
+            <a:schemeClr val="accent1"/>
+          </a:effectRef>
+          <a:fontRef idx="minor">
+            <a:schemeClr val="tx1"/>
+          </a:fontRef>
+        </p:style>
+      </p:cxnSp>
+      <p:cxnSp>
+        <p:nvCxnSpPr>
+          <p:cNvPr id="9" name="Straight Connector 8">
+            <a:extLst>
+              <a:ext uri="{FF2B5EF4-FFF2-40B4-BE49-F238E27FC236}">
+                <a16:creationId xmlns:a16="http://schemas.microsoft.com/office/drawing/2014/main" id="{09408979-0200-6BFD-02DD-154F9F38B4BA}"/>
+              </a:ext>
+            </a:extLst>
+          </p:cNvPr>
+          <p:cNvCxnSpPr/>
+          <p:nvPr/>
+        </p:nvCxnSpPr>
+        <p:spPr>
+          <a:xfrm>
+            <a:off x="4358084" y="1494152"/>
+            <a:ext cx="433633" cy="0"/>
+          </a:xfrm>
+          <a:prstGeom prst="line">
+            <a:avLst/>
+          </a:prstGeom>
+        </p:spPr>
+        <p:style>
+          <a:lnRef idx="3">
+            <a:schemeClr val="accent1"/>
+          </a:lnRef>
+          <a:fillRef idx="0">
+            <a:schemeClr val="accent1"/>
+          </a:fillRef>
+          <a:effectRef idx="2">
+            <a:schemeClr val="accent1"/>
+          </a:effectRef>
+          <a:fontRef idx="minor">
+            <a:schemeClr val="tx1"/>
+          </a:fontRef>
+        </p:style>
+      </p:cxnSp>
+      <p:cxnSp>
+        <p:nvCxnSpPr>
+          <p:cNvPr id="18" name="Straight Arrow Connector 17">
+            <a:extLst>
+              <a:ext uri="{FF2B5EF4-FFF2-40B4-BE49-F238E27FC236}">
+                <a16:creationId xmlns:a16="http://schemas.microsoft.com/office/drawing/2014/main" id="{B558479A-5B5C-D57D-C2B4-E745F79F5200}"/>
+              </a:ext>
+            </a:extLst>
+          </p:cNvPr>
+          <p:cNvCxnSpPr>
+            <a:cxnSpLocks/>
+          </p:cNvCxnSpPr>
+          <p:nvPr/>
+        </p:nvCxnSpPr>
+        <p:spPr>
+          <a:xfrm flipV="1">
+            <a:off x="5182838" y="2004472"/>
+            <a:ext cx="1033887" cy="3928"/>
+          </a:xfrm>
+          <a:prstGeom prst="straightConnector1">
+            <a:avLst/>
+          </a:prstGeom>
+          <a:ln>
+            <a:headEnd type="triangle"/>
+            <a:tailEnd type="triangle"/>
+          </a:ln>
+        </p:spPr>
+        <p:style>
+          <a:lnRef idx="2">
+            <a:schemeClr val="dk1"/>
+          </a:lnRef>
+          <a:fillRef idx="0">
+            <a:schemeClr val="dk1"/>
+          </a:fillRef>
+          <a:effectRef idx="1">
+            <a:schemeClr val="dk1"/>
+          </a:effectRef>
+          <a:fontRef idx="minor">
+            <a:schemeClr val="tx1"/>
+          </a:fontRef>
+        </p:style>
+      </p:cxnSp>
+      <p:sp>
+        <p:nvSpPr>
+          <p:cNvPr id="19" name="TextBox 18">
+            <a:extLst>
+              <a:ext uri="{FF2B5EF4-FFF2-40B4-BE49-F238E27FC236}">
+                <a16:creationId xmlns:a16="http://schemas.microsoft.com/office/drawing/2014/main" id="{6AD13F33-F4E2-367C-F7A7-9200A0B3E227}"/>
+              </a:ext>
+            </a:extLst>
+          </p:cNvPr>
+          <p:cNvSpPr txBox="1"/>
+          <p:nvPr/>
+        </p:nvSpPr>
+        <p:spPr>
+          <a:xfrm>
+            <a:off x="3768951" y="1022812"/>
+            <a:ext cx="474810" cy="276999"/>
+          </a:xfrm>
+          <a:prstGeom prst="rect">
+            <a:avLst/>
+          </a:prstGeom>
+          <a:noFill/>
+        </p:spPr>
+        <p:txBody>
+          <a:bodyPr wrap="none" rtlCol="0">
+            <a:spAutoFit/>
+          </a:bodyPr>
+          <a:lstStyle/>
+          <a:p>
+            <a:r>
+              <a:rPr lang="en-US" sz="1200" dirty="0"/>
+              <a:t>User</a:t>
+            </a:r>
+          </a:p>
+        </p:txBody>
+      </p:sp>
+      <p:sp>
+        <p:nvSpPr>
+          <p:cNvPr id="47" name="TextBox 46">
+            <a:extLst>
+              <a:ext uri="{FF2B5EF4-FFF2-40B4-BE49-F238E27FC236}">
+                <a16:creationId xmlns:a16="http://schemas.microsoft.com/office/drawing/2014/main" id="{9E9E4434-1B9E-E70E-DB03-048583B23A87}"/>
+              </a:ext>
+            </a:extLst>
+          </p:cNvPr>
+          <p:cNvSpPr txBox="1"/>
+          <p:nvPr/>
+        </p:nvSpPr>
+        <p:spPr>
+          <a:xfrm>
+            <a:off x="5057169" y="1655943"/>
+            <a:ext cx="1335308" cy="246221"/>
+          </a:xfrm>
+          <a:prstGeom prst="rect">
+            <a:avLst/>
+          </a:prstGeom>
+        </p:spPr>
+        <p:style>
+          <a:lnRef idx="3">
+            <a:schemeClr val="lt1"/>
+          </a:lnRef>
+          <a:fillRef idx="1">
+            <a:schemeClr val="accent1"/>
+          </a:fillRef>
+          <a:effectRef idx="1">
+            <a:schemeClr val="accent1"/>
+          </a:effectRef>
+          <a:fontRef idx="minor">
+            <a:schemeClr val="lt1"/>
+          </a:fontRef>
+        </p:style>
+        <p:txBody>
+          <a:bodyPr wrap="square" rtlCol="0">
+            <a:spAutoFit/>
+          </a:bodyPr>
+          <a:lstStyle/>
+          <a:p>
+            <a:r>
+              <a:rPr lang="en-US" sz="1000" dirty="0" err="1"/>
+              <a:t>userCode</a:t>
+            </a:r>
+            <a:r>
+              <a:rPr lang="en-US" sz="1000" dirty="0"/>
+              <a:t>: “</a:t>
+            </a:r>
+            <a:r>
+              <a:rPr lang="en-US" sz="1000" dirty="0" err="1"/>
+              <a:t>CAP_xxxx</a:t>
+            </a:r>
+            <a:r>
+              <a:rPr lang="en-US" sz="1000" dirty="0"/>
+              <a:t>”</a:t>
+            </a:r>
+          </a:p>
+        </p:txBody>
+      </p:sp>
+      <p:sp>
+        <p:nvSpPr>
+          <p:cNvPr id="49" name="Diamond 48">
+            <a:extLst>
+              <a:ext uri="{FF2B5EF4-FFF2-40B4-BE49-F238E27FC236}">
+                <a16:creationId xmlns:a16="http://schemas.microsoft.com/office/drawing/2014/main" id="{273D637C-2EF9-07A1-38A6-8F34AA1FC758}"/>
+              </a:ext>
+            </a:extLst>
+          </p:cNvPr>
+          <p:cNvSpPr/>
+          <p:nvPr/>
+        </p:nvSpPr>
+        <p:spPr>
+          <a:xfrm>
+            <a:off x="8774114" y="2904413"/>
+            <a:ext cx="1508446" cy="926609"/>
+          </a:xfrm>
+          <a:prstGeom prst="diamond">
+            <a:avLst/>
+          </a:prstGeom>
+        </p:spPr>
+        <p:style>
+          <a:lnRef idx="2">
+            <a:schemeClr val="dk1"/>
+          </a:lnRef>
+          <a:fillRef idx="1">
+            <a:schemeClr val="lt1"/>
+          </a:fillRef>
+          <a:effectRef idx="0">
+            <a:schemeClr val="dk1"/>
+          </a:effectRef>
+          <a:fontRef idx="minor">
+            <a:schemeClr val="dk1"/>
+          </a:fontRef>
+        </p:style>
+        <p:txBody>
+          <a:bodyPr rtlCol="0" anchor="ctr"/>
+          <a:lstStyle/>
+          <a:p>
+            <a:pPr algn="ctr"/>
+            <a:r>
+              <a:rPr lang="en-US" sz="1100" dirty="0"/>
+              <a:t>Generate access code</a:t>
+            </a:r>
+          </a:p>
+        </p:txBody>
+      </p:sp>
+      <p:sp>
+        <p:nvSpPr>
+          <p:cNvPr id="55" name="Cylinder 54">
+            <a:extLst>
+              <a:ext uri="{FF2B5EF4-FFF2-40B4-BE49-F238E27FC236}">
+                <a16:creationId xmlns:a16="http://schemas.microsoft.com/office/drawing/2014/main" id="{31711B1D-966A-646F-BD3C-82D2018EE132}"/>
+              </a:ext>
+            </a:extLst>
+          </p:cNvPr>
+          <p:cNvSpPr/>
+          <p:nvPr/>
+        </p:nvSpPr>
+        <p:spPr>
+          <a:xfrm>
+            <a:off x="9064211" y="5035431"/>
+            <a:ext cx="914400" cy="1216152"/>
+          </a:xfrm>
+          <a:prstGeom prst="can">
+            <a:avLst/>
+          </a:prstGeom>
+        </p:spPr>
+        <p:style>
+          <a:lnRef idx="2">
+            <a:schemeClr val="dk1"/>
+          </a:lnRef>
+          <a:fillRef idx="1">
+            <a:schemeClr val="lt1"/>
+          </a:fillRef>
+          <a:effectRef idx="0">
+            <a:schemeClr val="dk1"/>
+          </a:effectRef>
+          <a:fontRef idx="minor">
+            <a:schemeClr val="dk1"/>
+          </a:fontRef>
+        </p:style>
+        <p:txBody>
+          <a:bodyPr rtlCol="0" anchor="ctr"/>
+          <a:lstStyle/>
+          <a:p>
+            <a:pPr algn="ctr"/>
+            <a:r>
+              <a:rPr lang="en-US" sz="1200" dirty="0"/>
+              <a:t>Database</a:t>
+            </a:r>
+          </a:p>
+        </p:txBody>
+      </p:sp>
+      <p:cxnSp>
+        <p:nvCxnSpPr>
+          <p:cNvPr id="60" name="Straight Arrow Connector 59">
+            <a:extLst>
+              <a:ext uri="{FF2B5EF4-FFF2-40B4-BE49-F238E27FC236}">
+                <a16:creationId xmlns:a16="http://schemas.microsoft.com/office/drawing/2014/main" id="{F4E10C91-75D8-1188-4E5D-C53220E822FA}"/>
+              </a:ext>
+            </a:extLst>
+          </p:cNvPr>
+          <p:cNvCxnSpPr>
+            <a:cxnSpLocks/>
+            <a:stCxn id="49" idx="2"/>
+            <a:endCxn id="55" idx="1"/>
+          </p:cNvCxnSpPr>
+          <p:nvPr/>
+        </p:nvCxnSpPr>
+        <p:spPr>
+          <a:xfrm flipH="1">
+            <a:off x="9521411" y="3831022"/>
+            <a:ext cx="6926" cy="1204409"/>
+          </a:xfrm>
+          <a:prstGeom prst="straightConnector1">
+            <a:avLst/>
+          </a:prstGeom>
+          <a:ln>
+            <a:tailEnd type="triangle"/>
+          </a:ln>
+        </p:spPr>
+        <p:style>
+          <a:lnRef idx="1">
+            <a:schemeClr val="dk1"/>
+          </a:lnRef>
+          <a:fillRef idx="0">
+            <a:schemeClr val="dk1"/>
+          </a:fillRef>
+          <a:effectRef idx="0">
+            <a:schemeClr val="dk1"/>
+          </a:effectRef>
+          <a:fontRef idx="minor">
+            <a:schemeClr val="tx1"/>
+          </a:fontRef>
+        </p:style>
+      </p:cxnSp>
+      <p:cxnSp>
+        <p:nvCxnSpPr>
+          <p:cNvPr id="62" name="Straight Arrow Connector 61">
+            <a:extLst>
+              <a:ext uri="{FF2B5EF4-FFF2-40B4-BE49-F238E27FC236}">
+                <a16:creationId xmlns:a16="http://schemas.microsoft.com/office/drawing/2014/main" id="{4E8BABF1-877B-B707-27F3-42464A8B6FC5}"/>
+              </a:ext>
+            </a:extLst>
+          </p:cNvPr>
+          <p:cNvCxnSpPr>
+            <a:cxnSpLocks/>
+          </p:cNvCxnSpPr>
+          <p:nvPr/>
+        </p:nvCxnSpPr>
+        <p:spPr>
+          <a:xfrm>
+            <a:off x="7479636" y="3545094"/>
+            <a:ext cx="1584575" cy="0"/>
+          </a:xfrm>
+          <a:prstGeom prst="straightConnector1">
+            <a:avLst/>
+          </a:prstGeom>
+          <a:ln>
+            <a:tailEnd type="triangle"/>
+          </a:ln>
+        </p:spPr>
+        <p:style>
+          <a:lnRef idx="1">
+            <a:schemeClr val="dk1"/>
+          </a:lnRef>
+          <a:fillRef idx="0">
+            <a:schemeClr val="dk1"/>
+          </a:fillRef>
+          <a:effectRef idx="0">
+            <a:schemeClr val="dk1"/>
+          </a:effectRef>
+          <a:fontRef idx="minor">
+            <a:schemeClr val="tx1"/>
+          </a:fontRef>
+        </p:style>
+      </p:cxnSp>
+      <p:sp>
+        <p:nvSpPr>
+          <p:cNvPr id="71" name="Diamond 70">
+            <a:extLst>
+              <a:ext uri="{FF2B5EF4-FFF2-40B4-BE49-F238E27FC236}">
+                <a16:creationId xmlns:a16="http://schemas.microsoft.com/office/drawing/2014/main" id="{4B062FF2-B433-1072-B7D2-27BE68A06922}"/>
+              </a:ext>
+            </a:extLst>
+          </p:cNvPr>
+          <p:cNvSpPr/>
+          <p:nvPr/>
+        </p:nvSpPr>
+        <p:spPr>
+          <a:xfrm>
+            <a:off x="6218358" y="1644400"/>
+            <a:ext cx="1193377" cy="737467"/>
+          </a:xfrm>
+          <a:prstGeom prst="diamond">
+            <a:avLst/>
+          </a:prstGeom>
+        </p:spPr>
+        <p:style>
+          <a:lnRef idx="2">
+            <a:schemeClr val="dk1"/>
+          </a:lnRef>
+          <a:fillRef idx="1">
+            <a:schemeClr val="lt1"/>
+          </a:fillRef>
+          <a:effectRef idx="0">
+            <a:schemeClr val="dk1"/>
+          </a:effectRef>
+          <a:fontRef idx="minor">
+            <a:schemeClr val="dk1"/>
+          </a:fontRef>
+        </p:style>
+        <p:txBody>
+          <a:bodyPr rtlCol="0" anchor="ctr"/>
+          <a:lstStyle/>
+          <a:p>
+            <a:pPr algn="ctr"/>
+            <a:r>
+              <a:rPr lang="en-US" sz="1100" dirty="0"/>
+              <a:t>Login</a:t>
+            </a:r>
+          </a:p>
+        </p:txBody>
+      </p:sp>
+      <p:cxnSp>
+        <p:nvCxnSpPr>
+          <p:cNvPr id="87" name="Connector: Elbow 86">
+            <a:extLst>
+              <a:ext uri="{FF2B5EF4-FFF2-40B4-BE49-F238E27FC236}">
+                <a16:creationId xmlns:a16="http://schemas.microsoft.com/office/drawing/2014/main" id="{903E4C1C-21C3-BC5A-F636-A0E9080C3B29}"/>
+              </a:ext>
+            </a:extLst>
+          </p:cNvPr>
+          <p:cNvCxnSpPr>
+            <a:cxnSpLocks/>
+            <a:endCxn id="55" idx="2"/>
+          </p:cNvCxnSpPr>
+          <p:nvPr/>
+        </p:nvCxnSpPr>
+        <p:spPr>
+          <a:xfrm rot="16200000" flipH="1">
+            <a:off x="7255799" y="3835095"/>
+            <a:ext cx="1964348" cy="1652476"/>
+          </a:xfrm>
+          <a:prstGeom prst="bentConnector2">
+            <a:avLst/>
+          </a:prstGeom>
+          <a:ln>
+            <a:headEnd type="triangle"/>
+            <a:tailEnd type="triangle"/>
+          </a:ln>
+        </p:spPr>
+        <p:style>
+          <a:lnRef idx="1">
+            <a:schemeClr val="dk1"/>
+          </a:lnRef>
+          <a:fillRef idx="0">
+            <a:schemeClr val="dk1"/>
+          </a:fillRef>
+          <a:effectRef idx="0">
+            <a:schemeClr val="dk1"/>
+          </a:effectRef>
+          <a:fontRef idx="minor">
+            <a:schemeClr val="tx1"/>
+          </a:fontRef>
+        </p:style>
+      </p:cxnSp>
+      <p:sp>
+        <p:nvSpPr>
+          <p:cNvPr id="100" name="TextBox 99">
+            <a:extLst>
+              <a:ext uri="{FF2B5EF4-FFF2-40B4-BE49-F238E27FC236}">
+                <a16:creationId xmlns:a16="http://schemas.microsoft.com/office/drawing/2014/main" id="{FB987663-A967-61BC-BBB7-0E7AB2EEC6E3}"/>
+              </a:ext>
+            </a:extLst>
+          </p:cNvPr>
+          <p:cNvSpPr txBox="1"/>
+          <p:nvPr/>
+        </p:nvSpPr>
+        <p:spPr>
+          <a:xfrm>
+            <a:off x="8376642" y="3554023"/>
+            <a:ext cx="593111" cy="276999"/>
+          </a:xfrm>
+          <a:prstGeom prst="rect">
+            <a:avLst/>
+          </a:prstGeom>
+          <a:noFill/>
+        </p:spPr>
+        <p:txBody>
+          <a:bodyPr wrap="none" rtlCol="0">
+            <a:spAutoFit/>
+          </a:bodyPr>
+          <a:lstStyle/>
+          <a:p>
+            <a:r>
+              <a:rPr lang="en-US" sz="1200" dirty="0"/>
+              <a:t>Create</a:t>
+            </a:r>
+          </a:p>
+        </p:txBody>
+      </p:sp>
+      <p:sp>
+        <p:nvSpPr>
+          <p:cNvPr id="103" name="TextBox 102">
+            <a:extLst>
+              <a:ext uri="{FF2B5EF4-FFF2-40B4-BE49-F238E27FC236}">
+                <a16:creationId xmlns:a16="http://schemas.microsoft.com/office/drawing/2014/main" id="{121E7768-752D-12BA-8DEE-29AF15958F31}"/>
+              </a:ext>
+            </a:extLst>
+          </p:cNvPr>
+          <p:cNvSpPr txBox="1"/>
+          <p:nvPr/>
+        </p:nvSpPr>
+        <p:spPr>
+          <a:xfrm>
+            <a:off x="9539067" y="3831022"/>
+            <a:ext cx="470770" cy="276999"/>
+          </a:xfrm>
+          <a:prstGeom prst="rect">
+            <a:avLst/>
+          </a:prstGeom>
+          <a:noFill/>
+        </p:spPr>
+        <p:txBody>
+          <a:bodyPr wrap="none" rtlCol="0">
+            <a:spAutoFit/>
+          </a:bodyPr>
+          <a:lstStyle/>
+          <a:p>
+            <a:r>
+              <a:rPr lang="en-US" sz="1200" dirty="0"/>
+              <a:t>Save</a:t>
+            </a:r>
+          </a:p>
+        </p:txBody>
+      </p:sp>
+      <p:cxnSp>
+        <p:nvCxnSpPr>
+          <p:cNvPr id="106" name="Straight Arrow Connector 105">
+            <a:extLst>
+              <a:ext uri="{FF2B5EF4-FFF2-40B4-BE49-F238E27FC236}">
+                <a16:creationId xmlns:a16="http://schemas.microsoft.com/office/drawing/2014/main" id="{77E1840A-FF22-90C0-E2F4-CD02F74C52D0}"/>
+              </a:ext>
+            </a:extLst>
+          </p:cNvPr>
+          <p:cNvCxnSpPr>
+            <a:cxnSpLocks/>
+          </p:cNvCxnSpPr>
+          <p:nvPr/>
+        </p:nvCxnSpPr>
+        <p:spPr>
+          <a:xfrm flipH="1">
+            <a:off x="7479636" y="3179570"/>
+            <a:ext cx="1602231" cy="0"/>
+          </a:xfrm>
+          <a:prstGeom prst="straightConnector1">
+            <a:avLst/>
+          </a:prstGeom>
+          <a:ln>
+            <a:tailEnd type="triangle"/>
+          </a:ln>
+        </p:spPr>
+        <p:style>
+          <a:lnRef idx="1">
+            <a:schemeClr val="dk1"/>
+          </a:lnRef>
+          <a:fillRef idx="0">
+            <a:schemeClr val="dk1"/>
+          </a:fillRef>
+          <a:effectRef idx="0">
+            <a:schemeClr val="dk1"/>
+          </a:effectRef>
+          <a:fontRef idx="minor">
+            <a:schemeClr val="tx1"/>
+          </a:fontRef>
+        </p:style>
+      </p:cxnSp>
+      <p:sp>
+        <p:nvSpPr>
+          <p:cNvPr id="107" name="TextBox 106">
+            <a:extLst>
+              <a:ext uri="{FF2B5EF4-FFF2-40B4-BE49-F238E27FC236}">
+                <a16:creationId xmlns:a16="http://schemas.microsoft.com/office/drawing/2014/main" id="{BC981C7B-3830-FC3B-01C7-50775558CD6B}"/>
+              </a:ext>
+            </a:extLst>
+          </p:cNvPr>
+          <p:cNvSpPr txBox="1"/>
+          <p:nvPr/>
+        </p:nvSpPr>
+        <p:spPr>
+          <a:xfrm>
+            <a:off x="7509333" y="2894677"/>
+            <a:ext cx="951120" cy="276999"/>
+          </a:xfrm>
+          <a:prstGeom prst="rect">
+            <a:avLst/>
+          </a:prstGeom>
+          <a:noFill/>
+        </p:spPr>
+        <p:txBody>
+          <a:bodyPr wrap="square" rtlCol="0">
+            <a:spAutoFit/>
+          </a:bodyPr>
+          <a:lstStyle/>
+          <a:p>
+            <a:r>
+              <a:rPr lang="en-US" sz="1200" dirty="0"/>
+              <a:t>Access code</a:t>
+            </a:r>
+          </a:p>
+        </p:txBody>
+      </p:sp>
+      <p:sp>
+        <p:nvSpPr>
+          <p:cNvPr id="110" name="Rectangle 109">
+            <a:extLst>
+              <a:ext uri="{FF2B5EF4-FFF2-40B4-BE49-F238E27FC236}">
+                <a16:creationId xmlns:a16="http://schemas.microsoft.com/office/drawing/2014/main" id="{1611D883-6C50-C3FD-C59F-992E74775250}"/>
+              </a:ext>
+            </a:extLst>
+          </p:cNvPr>
+          <p:cNvSpPr/>
+          <p:nvPr/>
+        </p:nvSpPr>
+        <p:spPr>
+          <a:xfrm>
+            <a:off x="3925880" y="4292687"/>
+            <a:ext cx="1329180" cy="556181"/>
+          </a:xfrm>
+          <a:prstGeom prst="rect">
+            <a:avLst/>
+          </a:prstGeom>
+        </p:spPr>
+        <p:style>
+          <a:lnRef idx="2">
+            <a:schemeClr val="dk1"/>
+          </a:lnRef>
+          <a:fillRef idx="1">
+            <a:schemeClr val="lt1"/>
+          </a:fillRef>
+          <a:effectRef idx="0">
+            <a:schemeClr val="dk1"/>
+          </a:effectRef>
+          <a:fontRef idx="minor">
+            <a:schemeClr val="dk1"/>
+          </a:fontRef>
+        </p:style>
+        <p:txBody>
+          <a:bodyPr rtlCol="0" anchor="ctr"/>
+          <a:lstStyle/>
+          <a:p>
+            <a:pPr algn="ctr"/>
+            <a:r>
+              <a:rPr lang="en-US" sz="1600" dirty="0"/>
+              <a:t>Mail service</a:t>
+            </a:r>
+          </a:p>
+        </p:txBody>
+      </p:sp>
+      <p:sp>
+        <p:nvSpPr>
+          <p:cNvPr id="127" name="TextBox 126">
+            <a:extLst>
+              <a:ext uri="{FF2B5EF4-FFF2-40B4-BE49-F238E27FC236}">
+                <a16:creationId xmlns:a16="http://schemas.microsoft.com/office/drawing/2014/main" id="{85D0D4CD-BA54-88B7-2016-70B1FBBE1322}"/>
+              </a:ext>
+            </a:extLst>
+          </p:cNvPr>
+          <p:cNvSpPr txBox="1"/>
+          <p:nvPr/>
+        </p:nvSpPr>
+        <p:spPr>
+          <a:xfrm>
+            <a:off x="4575757" y="2148109"/>
+            <a:ext cx="795411" cy="276999"/>
+          </a:xfrm>
+          <a:prstGeom prst="rect">
+            <a:avLst/>
+          </a:prstGeom>
+          <a:noFill/>
+        </p:spPr>
+        <p:txBody>
+          <a:bodyPr wrap="none" rtlCol="0">
+            <a:spAutoFit/>
+          </a:bodyPr>
+          <a:lstStyle/>
+          <a:p>
+            <a:r>
+              <a:rPr lang="en-US" sz="1200" dirty="0"/>
+              <a:t>Send mail</a:t>
+            </a:r>
+          </a:p>
+        </p:txBody>
+      </p:sp>
+      <p:sp>
+        <p:nvSpPr>
+          <p:cNvPr id="129" name="TextBox 128">
+            <a:extLst>
+              <a:ext uri="{FF2B5EF4-FFF2-40B4-BE49-F238E27FC236}">
+                <a16:creationId xmlns:a16="http://schemas.microsoft.com/office/drawing/2014/main" id="{DCC98F93-D6DA-50C4-3365-F8EF6D82A539}"/>
+              </a:ext>
+            </a:extLst>
+          </p:cNvPr>
+          <p:cNvSpPr txBox="1"/>
+          <p:nvPr/>
+        </p:nvSpPr>
+        <p:spPr>
+          <a:xfrm>
+            <a:off x="5057796" y="805999"/>
+            <a:ext cx="1335308" cy="246221"/>
+          </a:xfrm>
+          <a:prstGeom prst="rect">
+            <a:avLst/>
+          </a:prstGeom>
+        </p:spPr>
+        <p:style>
+          <a:lnRef idx="3">
+            <a:schemeClr val="lt1"/>
+          </a:lnRef>
+          <a:fillRef idx="1">
+            <a:schemeClr val="accent1"/>
+          </a:fillRef>
+          <a:effectRef idx="1">
+            <a:schemeClr val="accent1"/>
+          </a:effectRef>
+          <a:fontRef idx="minor">
+            <a:schemeClr val="lt1"/>
+          </a:fontRef>
+        </p:style>
+        <p:txBody>
+          <a:bodyPr wrap="square" rtlCol="0">
+            <a:spAutoFit/>
+          </a:bodyPr>
+          <a:lstStyle/>
+          <a:p>
+            <a:r>
+              <a:rPr lang="en-US" sz="1000" dirty="0" err="1"/>
+              <a:t>accessCode</a:t>
+            </a:r>
+            <a:r>
+              <a:rPr lang="en-US" sz="1000" dirty="0"/>
+              <a:t>: “</a:t>
+            </a:r>
+            <a:r>
+              <a:rPr lang="en-US" sz="1000" dirty="0" err="1"/>
+              <a:t>xxxxx</a:t>
+            </a:r>
+            <a:r>
+              <a:rPr lang="en-US" sz="1000" dirty="0"/>
+              <a:t>”</a:t>
+            </a:r>
+          </a:p>
+        </p:txBody>
+      </p:sp>
+      <p:sp>
+        <p:nvSpPr>
+          <p:cNvPr id="145" name="Rectangle 144">
+            <a:extLst>
+              <a:ext uri="{FF2B5EF4-FFF2-40B4-BE49-F238E27FC236}">
+                <a16:creationId xmlns:a16="http://schemas.microsoft.com/office/drawing/2014/main" id="{1971E8F6-1BF2-97E2-FADF-2436512748FC}"/>
+              </a:ext>
+            </a:extLst>
+          </p:cNvPr>
+          <p:cNvSpPr/>
+          <p:nvPr/>
+        </p:nvSpPr>
+        <p:spPr>
+          <a:xfrm>
+            <a:off x="8154185" y="937971"/>
+            <a:ext cx="1329180" cy="556181"/>
+          </a:xfrm>
+          <a:prstGeom prst="rect">
+            <a:avLst/>
+          </a:prstGeom>
+        </p:spPr>
+        <p:style>
+          <a:lnRef idx="2">
+            <a:schemeClr val="dk1"/>
+          </a:lnRef>
+          <a:fillRef idx="1">
+            <a:schemeClr val="lt1"/>
+          </a:fillRef>
+          <a:effectRef idx="0">
+            <a:schemeClr val="dk1"/>
+          </a:effectRef>
+          <a:fontRef idx="minor">
+            <a:schemeClr val="dk1"/>
+          </a:fontRef>
+        </p:style>
+        <p:txBody>
+          <a:bodyPr rtlCol="0" anchor="ctr"/>
+          <a:lstStyle/>
+          <a:p>
+            <a:pPr algn="ctr"/>
+            <a:r>
+              <a:rPr lang="en-US" sz="1600" dirty="0"/>
+              <a:t>Message service</a:t>
+            </a:r>
+          </a:p>
+        </p:txBody>
+      </p:sp>
+      <p:sp>
+        <p:nvSpPr>
+          <p:cNvPr id="152" name="Cylinder 151">
+            <a:extLst>
+              <a:ext uri="{FF2B5EF4-FFF2-40B4-BE49-F238E27FC236}">
+                <a16:creationId xmlns:a16="http://schemas.microsoft.com/office/drawing/2014/main" id="{F7613172-152D-F3C5-5293-ED39A9C18CD0}"/>
+              </a:ext>
+            </a:extLst>
+          </p:cNvPr>
+          <p:cNvSpPr/>
+          <p:nvPr/>
+        </p:nvSpPr>
+        <p:spPr>
+          <a:xfrm>
+            <a:off x="10784421" y="596567"/>
+            <a:ext cx="914400" cy="1216152"/>
+          </a:xfrm>
+          <a:prstGeom prst="can">
+            <a:avLst/>
+          </a:prstGeom>
+        </p:spPr>
+        <p:style>
+          <a:lnRef idx="2">
+            <a:schemeClr val="dk1"/>
+          </a:lnRef>
+          <a:fillRef idx="1">
+            <a:schemeClr val="lt1"/>
+          </a:fillRef>
+          <a:effectRef idx="0">
+            <a:schemeClr val="dk1"/>
+          </a:effectRef>
+          <a:fontRef idx="minor">
+            <a:schemeClr val="dk1"/>
+          </a:fontRef>
+        </p:style>
+        <p:txBody>
+          <a:bodyPr rtlCol="0" anchor="ctr"/>
+          <a:lstStyle/>
+          <a:p>
+            <a:pPr algn="ctr"/>
+            <a:r>
+              <a:rPr lang="en-US" sz="1200" dirty="0"/>
+              <a:t>Database</a:t>
+            </a:r>
+          </a:p>
+        </p:txBody>
+      </p:sp>
+      <p:cxnSp>
+        <p:nvCxnSpPr>
+          <p:cNvPr id="154" name="Straight Arrow Connector 153">
+            <a:extLst>
+              <a:ext uri="{FF2B5EF4-FFF2-40B4-BE49-F238E27FC236}">
+                <a16:creationId xmlns:a16="http://schemas.microsoft.com/office/drawing/2014/main" id="{DD018EB2-3D4A-F3FD-27B8-5E16CD2F94DA}"/>
+              </a:ext>
+            </a:extLst>
+          </p:cNvPr>
+          <p:cNvCxnSpPr>
+            <a:cxnSpLocks/>
+          </p:cNvCxnSpPr>
+          <p:nvPr/>
+        </p:nvCxnSpPr>
+        <p:spPr>
+          <a:xfrm flipV="1">
+            <a:off x="9483365" y="1370816"/>
+            <a:ext cx="1301056" cy="11419"/>
+          </a:xfrm>
+          <a:prstGeom prst="straightConnector1">
+            <a:avLst/>
+          </a:prstGeom>
+          <a:ln>
+            <a:tailEnd type="triangle"/>
+          </a:ln>
+        </p:spPr>
+        <p:style>
+          <a:lnRef idx="1">
+            <a:schemeClr val="dk1"/>
+          </a:lnRef>
+          <a:fillRef idx="0">
+            <a:schemeClr val="dk1"/>
+          </a:fillRef>
+          <a:effectRef idx="0">
+            <a:schemeClr val="dk1"/>
+          </a:effectRef>
+          <a:fontRef idx="minor">
+            <a:schemeClr val="tx1"/>
+          </a:fontRef>
+        </p:style>
+      </p:cxnSp>
+      <p:cxnSp>
+        <p:nvCxnSpPr>
+          <p:cNvPr id="156" name="Straight Arrow Connector 155">
+            <a:extLst>
+              <a:ext uri="{FF2B5EF4-FFF2-40B4-BE49-F238E27FC236}">
+                <a16:creationId xmlns:a16="http://schemas.microsoft.com/office/drawing/2014/main" id="{96BD6590-C109-0D8B-944B-356E14F729E5}"/>
+              </a:ext>
+            </a:extLst>
+          </p:cNvPr>
+          <p:cNvCxnSpPr>
+            <a:cxnSpLocks/>
+          </p:cNvCxnSpPr>
+          <p:nvPr/>
+        </p:nvCxnSpPr>
+        <p:spPr>
+          <a:xfrm flipH="1">
+            <a:off x="9483365" y="999583"/>
+            <a:ext cx="1301056" cy="11419"/>
+          </a:xfrm>
+          <a:prstGeom prst="straightConnector1">
+            <a:avLst/>
+          </a:prstGeom>
+          <a:ln>
+            <a:tailEnd type="triangle"/>
+          </a:ln>
+        </p:spPr>
+        <p:style>
+          <a:lnRef idx="1">
+            <a:schemeClr val="dk1"/>
+          </a:lnRef>
+          <a:fillRef idx="0">
+            <a:schemeClr val="dk1"/>
+          </a:fillRef>
+          <a:effectRef idx="0">
+            <a:schemeClr val="dk1"/>
+          </a:effectRef>
+          <a:fontRef idx="minor">
+            <a:schemeClr val="tx1"/>
+          </a:fontRef>
+        </p:style>
+      </p:cxnSp>
+      <p:sp>
+        <p:nvSpPr>
+          <p:cNvPr id="158" name="TextBox 157">
+            <a:extLst>
+              <a:ext uri="{FF2B5EF4-FFF2-40B4-BE49-F238E27FC236}">
+                <a16:creationId xmlns:a16="http://schemas.microsoft.com/office/drawing/2014/main" id="{0782B7BF-25A8-BFEE-EFEB-B8A22A348931}"/>
+              </a:ext>
+            </a:extLst>
+          </p:cNvPr>
+          <p:cNvSpPr txBox="1"/>
+          <p:nvPr/>
+        </p:nvSpPr>
+        <p:spPr>
+          <a:xfrm>
+            <a:off x="9483365" y="1403423"/>
+            <a:ext cx="559769" cy="276999"/>
+          </a:xfrm>
+          <a:prstGeom prst="rect">
+            <a:avLst/>
+          </a:prstGeom>
+          <a:noFill/>
+        </p:spPr>
+        <p:txBody>
+          <a:bodyPr wrap="none" rtlCol="0">
+            <a:spAutoFit/>
+          </a:bodyPr>
+          <a:lstStyle/>
+          <a:p>
+            <a:r>
+              <a:rPr lang="en-US" sz="1200" dirty="0"/>
+              <a:t>Check</a:t>
+            </a:r>
+          </a:p>
+        </p:txBody>
+      </p:sp>
+      <p:sp>
+        <p:nvSpPr>
+          <p:cNvPr id="159" name="TextBox 158">
+            <a:extLst>
+              <a:ext uri="{FF2B5EF4-FFF2-40B4-BE49-F238E27FC236}">
+                <a16:creationId xmlns:a16="http://schemas.microsoft.com/office/drawing/2014/main" id="{A95C4760-E048-BD8F-5984-E99484D3CAF5}"/>
+              </a:ext>
+            </a:extLst>
+          </p:cNvPr>
+          <p:cNvSpPr txBox="1"/>
+          <p:nvPr/>
+        </p:nvSpPr>
+        <p:spPr>
+          <a:xfrm>
+            <a:off x="9527958" y="715451"/>
+            <a:ext cx="605935" cy="276999"/>
+          </a:xfrm>
+          <a:prstGeom prst="rect">
+            <a:avLst/>
+          </a:prstGeom>
+          <a:noFill/>
+        </p:spPr>
+        <p:txBody>
+          <a:bodyPr wrap="none" rtlCol="0">
+            <a:spAutoFit/>
+          </a:bodyPr>
+          <a:lstStyle/>
+          <a:p>
+            <a:r>
+              <a:rPr lang="en-US" sz="1200" dirty="0"/>
+              <a:t>Return</a:t>
+            </a:r>
+          </a:p>
+        </p:txBody>
+      </p:sp>
+      <p:cxnSp>
+        <p:nvCxnSpPr>
+          <p:cNvPr id="165" name="Straight Arrow Connector 164">
+            <a:extLst>
+              <a:ext uri="{FF2B5EF4-FFF2-40B4-BE49-F238E27FC236}">
+                <a16:creationId xmlns:a16="http://schemas.microsoft.com/office/drawing/2014/main" id="{5F0B628E-221E-8196-283D-9173F7A2A2BF}"/>
+              </a:ext>
+            </a:extLst>
+          </p:cNvPr>
+          <p:cNvCxnSpPr>
+            <a:cxnSpLocks/>
+          </p:cNvCxnSpPr>
+          <p:nvPr/>
+        </p:nvCxnSpPr>
+        <p:spPr>
+          <a:xfrm>
+            <a:off x="6440250" y="2180540"/>
+            <a:ext cx="0" cy="851577"/>
+          </a:xfrm>
+          <a:prstGeom prst="straightConnector1">
+            <a:avLst/>
+          </a:prstGeom>
+          <a:ln>
+            <a:tailEnd type="triangle"/>
+          </a:ln>
+        </p:spPr>
+        <p:style>
+          <a:lnRef idx="1">
+            <a:schemeClr val="dk1"/>
+          </a:lnRef>
+          <a:fillRef idx="0">
+            <a:schemeClr val="dk1"/>
+          </a:fillRef>
+          <a:effectRef idx="0">
+            <a:schemeClr val="dk1"/>
+          </a:effectRef>
+          <a:fontRef idx="minor">
+            <a:schemeClr val="tx1"/>
+          </a:fontRef>
+        </p:style>
+      </p:cxnSp>
+      <p:cxnSp>
+        <p:nvCxnSpPr>
+          <p:cNvPr id="167" name="Straight Arrow Connector 166">
+            <a:extLst>
+              <a:ext uri="{FF2B5EF4-FFF2-40B4-BE49-F238E27FC236}">
+                <a16:creationId xmlns:a16="http://schemas.microsoft.com/office/drawing/2014/main" id="{1D87E7C2-60D8-A8B7-696B-75CAFA256DBC}"/>
+              </a:ext>
+            </a:extLst>
+          </p:cNvPr>
+          <p:cNvCxnSpPr>
+            <a:cxnSpLocks/>
+          </p:cNvCxnSpPr>
+          <p:nvPr/>
+        </p:nvCxnSpPr>
+        <p:spPr>
+          <a:xfrm flipV="1">
+            <a:off x="7222504" y="2135826"/>
+            <a:ext cx="0" cy="934544"/>
+          </a:xfrm>
+          <a:prstGeom prst="straightConnector1">
+            <a:avLst/>
+          </a:prstGeom>
+          <a:ln>
+            <a:tailEnd type="triangle"/>
+          </a:ln>
+        </p:spPr>
+        <p:style>
+          <a:lnRef idx="1">
+            <a:schemeClr val="dk1"/>
+          </a:lnRef>
+          <a:fillRef idx="0">
+            <a:schemeClr val="dk1"/>
+          </a:fillRef>
+          <a:effectRef idx="0">
+            <a:schemeClr val="dk1"/>
+          </a:effectRef>
+          <a:fontRef idx="minor">
+            <a:schemeClr val="tx1"/>
+          </a:fontRef>
+        </p:style>
+      </p:cxnSp>
+      <p:sp>
+        <p:nvSpPr>
+          <p:cNvPr id="168" name="TextBox 167">
+            <a:extLst>
+              <a:ext uri="{FF2B5EF4-FFF2-40B4-BE49-F238E27FC236}">
+                <a16:creationId xmlns:a16="http://schemas.microsoft.com/office/drawing/2014/main" id="{E6472958-0701-0D7E-516E-A25B7FAB7BF2}"/>
+              </a:ext>
+            </a:extLst>
+          </p:cNvPr>
+          <p:cNvSpPr txBox="1"/>
+          <p:nvPr/>
+        </p:nvSpPr>
+        <p:spPr>
+          <a:xfrm>
+            <a:off x="5655380" y="2783140"/>
+            <a:ext cx="813364" cy="276999"/>
+          </a:xfrm>
+          <a:prstGeom prst="rect">
+            <a:avLst/>
+          </a:prstGeom>
+          <a:noFill/>
+        </p:spPr>
+        <p:txBody>
+          <a:bodyPr wrap="none" rtlCol="0">
+            <a:spAutoFit/>
+          </a:bodyPr>
+          <a:lstStyle/>
+          <a:p>
+            <a:pPr algn="ctr"/>
+            <a:r>
+              <a:rPr lang="en-US" sz="1200" dirty="0"/>
+              <a:t>User code</a:t>
+            </a:r>
+          </a:p>
+        </p:txBody>
+      </p:sp>
+      <p:sp>
+        <p:nvSpPr>
+          <p:cNvPr id="171" name="TextBox 170">
+            <a:extLst>
+              <a:ext uri="{FF2B5EF4-FFF2-40B4-BE49-F238E27FC236}">
+                <a16:creationId xmlns:a16="http://schemas.microsoft.com/office/drawing/2014/main" id="{9A202518-471E-BB17-456F-EC32C5BFCBF9}"/>
+              </a:ext>
+            </a:extLst>
+          </p:cNvPr>
+          <p:cNvSpPr txBox="1"/>
+          <p:nvPr/>
+        </p:nvSpPr>
+        <p:spPr>
+          <a:xfrm>
+            <a:off x="7215080" y="2259690"/>
+            <a:ext cx="1261564" cy="276999"/>
+          </a:xfrm>
+          <a:prstGeom prst="rect">
+            <a:avLst/>
+          </a:prstGeom>
+          <a:noFill/>
+        </p:spPr>
+        <p:txBody>
+          <a:bodyPr wrap="none" rtlCol="0">
+            <a:spAutoFit/>
+          </a:bodyPr>
+          <a:lstStyle/>
+          <a:p>
+            <a:r>
+              <a:rPr lang="en-US" sz="1200" dirty="0"/>
+              <a:t>Reject if not exist</a:t>
+            </a:r>
+          </a:p>
+        </p:txBody>
+      </p:sp>
+      <p:sp>
+        <p:nvSpPr>
+          <p:cNvPr id="172" name="TextBox 171">
+            <a:extLst>
+              <a:ext uri="{FF2B5EF4-FFF2-40B4-BE49-F238E27FC236}">
+                <a16:creationId xmlns:a16="http://schemas.microsoft.com/office/drawing/2014/main" id="{A9F05840-CE1D-8301-BB33-A0CB53A6176A}"/>
+              </a:ext>
+            </a:extLst>
+          </p:cNvPr>
+          <p:cNvSpPr txBox="1"/>
+          <p:nvPr/>
+        </p:nvSpPr>
+        <p:spPr>
+          <a:xfrm>
+            <a:off x="7845862" y="5374402"/>
+            <a:ext cx="1204497" cy="276999"/>
+          </a:xfrm>
+          <a:prstGeom prst="rect">
+            <a:avLst/>
+          </a:prstGeom>
+          <a:noFill/>
+        </p:spPr>
+        <p:txBody>
+          <a:bodyPr wrap="none" rtlCol="0">
+            <a:spAutoFit/>
+          </a:bodyPr>
+          <a:lstStyle/>
+          <a:p>
+            <a:r>
+              <a:rPr lang="en-US" sz="1200" dirty="0"/>
+              <a:t>Check user code</a:t>
+            </a:r>
+          </a:p>
+        </p:txBody>
+      </p:sp>
+      <p:sp>
+        <p:nvSpPr>
+          <p:cNvPr id="173" name="TextBox 172">
+            <a:extLst>
+              <a:ext uri="{FF2B5EF4-FFF2-40B4-BE49-F238E27FC236}">
+                <a16:creationId xmlns:a16="http://schemas.microsoft.com/office/drawing/2014/main" id="{C6F3B130-08F8-2F1F-1D97-98BC6E292184}"/>
+              </a:ext>
+            </a:extLst>
+          </p:cNvPr>
+          <p:cNvSpPr txBox="1"/>
+          <p:nvPr/>
+        </p:nvSpPr>
+        <p:spPr>
+          <a:xfrm>
+            <a:off x="7376093" y="3831022"/>
+            <a:ext cx="951671" cy="461665"/>
+          </a:xfrm>
+          <a:prstGeom prst="rect">
+            <a:avLst/>
+          </a:prstGeom>
+          <a:noFill/>
+        </p:spPr>
+        <p:txBody>
+          <a:bodyPr wrap="none" rtlCol="0">
+            <a:spAutoFit/>
+          </a:bodyPr>
+          <a:lstStyle/>
+          <a:p>
+            <a:r>
+              <a:rPr lang="en-US" sz="1200" dirty="0"/>
+              <a:t>Return</a:t>
+            </a:r>
+          </a:p>
+          <a:p>
+            <a:r>
+              <a:rPr lang="en-US" sz="1200" dirty="0"/>
+              <a:t>exists or not</a:t>
+            </a:r>
+          </a:p>
+        </p:txBody>
+      </p:sp>
+      <p:cxnSp>
+        <p:nvCxnSpPr>
+          <p:cNvPr id="177" name="Connector: Elbow 176">
+            <a:extLst>
+              <a:ext uri="{FF2B5EF4-FFF2-40B4-BE49-F238E27FC236}">
+                <a16:creationId xmlns:a16="http://schemas.microsoft.com/office/drawing/2014/main" id="{5EB1712E-376D-9A28-3916-500191F01D57}"/>
+              </a:ext>
+            </a:extLst>
+          </p:cNvPr>
+          <p:cNvCxnSpPr>
+            <a:cxnSpLocks/>
+            <a:stCxn id="2" idx="1"/>
+            <a:endCxn id="110" idx="3"/>
+          </p:cNvCxnSpPr>
+          <p:nvPr/>
+        </p:nvCxnSpPr>
+        <p:spPr>
+          <a:xfrm rot="10800000" flipV="1">
+            <a:off x="5255060" y="3355638"/>
+            <a:ext cx="895396" cy="1215140"/>
+          </a:xfrm>
+          <a:prstGeom prst="bentConnector3">
+            <a:avLst>
+              <a:gd name="adj1" fmla="val 50000"/>
+            </a:avLst>
+          </a:prstGeom>
+          <a:ln>
+            <a:tailEnd type="triangle"/>
+          </a:ln>
+        </p:spPr>
+        <p:style>
+          <a:lnRef idx="1">
+            <a:schemeClr val="dk1"/>
+          </a:lnRef>
+          <a:fillRef idx="0">
+            <a:schemeClr val="dk1"/>
+          </a:fillRef>
+          <a:effectRef idx="0">
+            <a:schemeClr val="dk1"/>
+          </a:effectRef>
+          <a:fontRef idx="minor">
+            <a:schemeClr val="tx1"/>
+          </a:fontRef>
+        </p:style>
+      </p:cxnSp>
+      <p:sp>
+        <p:nvSpPr>
+          <p:cNvPr id="183" name="TextBox 182">
+            <a:extLst>
+              <a:ext uri="{FF2B5EF4-FFF2-40B4-BE49-F238E27FC236}">
+                <a16:creationId xmlns:a16="http://schemas.microsoft.com/office/drawing/2014/main" id="{2017BC89-4D32-93FA-76A9-AA2449D0A43B}"/>
+              </a:ext>
+            </a:extLst>
+          </p:cNvPr>
+          <p:cNvSpPr txBox="1"/>
+          <p:nvPr/>
+        </p:nvSpPr>
+        <p:spPr>
+          <a:xfrm>
+            <a:off x="5304351" y="4571868"/>
+            <a:ext cx="943207" cy="276999"/>
+          </a:xfrm>
+          <a:prstGeom prst="rect">
+            <a:avLst/>
+          </a:prstGeom>
+          <a:noFill/>
+        </p:spPr>
+        <p:txBody>
+          <a:bodyPr wrap="none" rtlCol="0">
+            <a:spAutoFit/>
+          </a:bodyPr>
+          <a:lstStyle/>
+          <a:p>
+            <a:r>
+              <a:rPr lang="en-US" sz="1200" dirty="0"/>
+              <a:t>Access code</a:t>
+            </a:r>
+          </a:p>
+        </p:txBody>
+      </p:sp>
+      <p:cxnSp>
+        <p:nvCxnSpPr>
+          <p:cNvPr id="188" name="Straight Arrow Connector 187">
+            <a:extLst>
+              <a:ext uri="{FF2B5EF4-FFF2-40B4-BE49-F238E27FC236}">
+                <a16:creationId xmlns:a16="http://schemas.microsoft.com/office/drawing/2014/main" id="{E61FB134-1075-3660-6434-C58E012C0F9B}"/>
+              </a:ext>
+            </a:extLst>
+          </p:cNvPr>
+          <p:cNvCxnSpPr>
+            <a:cxnSpLocks/>
+            <a:stCxn id="110" idx="0"/>
+          </p:cNvCxnSpPr>
+          <p:nvPr/>
+        </p:nvCxnSpPr>
+        <p:spPr>
+          <a:xfrm flipV="1">
+            <a:off x="4590470" y="2036429"/>
+            <a:ext cx="0" cy="2256258"/>
+          </a:xfrm>
+          <a:prstGeom prst="straightConnector1">
+            <a:avLst/>
+          </a:prstGeom>
+          <a:ln>
+            <a:tailEnd type="triangle"/>
+          </a:ln>
+        </p:spPr>
+        <p:style>
+          <a:lnRef idx="1">
+            <a:schemeClr val="dk1"/>
+          </a:lnRef>
+          <a:fillRef idx="0">
+            <a:schemeClr val="dk1"/>
+          </a:fillRef>
+          <a:effectRef idx="0">
+            <a:schemeClr val="dk1"/>
+          </a:effectRef>
+          <a:fontRef idx="minor">
+            <a:schemeClr val="tx1"/>
+          </a:fontRef>
+        </p:style>
+      </p:cxnSp>
+      <p:cxnSp>
+        <p:nvCxnSpPr>
+          <p:cNvPr id="200" name="Straight Arrow Connector 199">
+            <a:extLst>
+              <a:ext uri="{FF2B5EF4-FFF2-40B4-BE49-F238E27FC236}">
+                <a16:creationId xmlns:a16="http://schemas.microsoft.com/office/drawing/2014/main" id="{9E661884-1EB3-6798-D1B3-CDA8A82EF490}"/>
+              </a:ext>
+            </a:extLst>
+          </p:cNvPr>
+          <p:cNvCxnSpPr/>
+          <p:nvPr/>
+        </p:nvCxnSpPr>
+        <p:spPr>
+          <a:xfrm flipV="1">
+            <a:off x="5057169" y="1105655"/>
+            <a:ext cx="3097016" cy="7616"/>
+          </a:xfrm>
+          <a:prstGeom prst="straightConnector1">
+            <a:avLst/>
+          </a:prstGeom>
+          <a:ln>
+            <a:tailEnd type="triangle"/>
+          </a:ln>
+        </p:spPr>
+        <p:style>
+          <a:lnRef idx="1">
+            <a:schemeClr val="dk1"/>
+          </a:lnRef>
+          <a:fillRef idx="0">
+            <a:schemeClr val="dk1"/>
+          </a:fillRef>
+          <a:effectRef idx="0">
+            <a:schemeClr val="dk1"/>
+          </a:effectRef>
+          <a:fontRef idx="minor">
+            <a:schemeClr val="tx1"/>
+          </a:fontRef>
+        </p:style>
+      </p:cxnSp>
+      <p:cxnSp>
+        <p:nvCxnSpPr>
+          <p:cNvPr id="203" name="Straight Arrow Connector 202">
+            <a:extLst>
+              <a:ext uri="{FF2B5EF4-FFF2-40B4-BE49-F238E27FC236}">
+                <a16:creationId xmlns:a16="http://schemas.microsoft.com/office/drawing/2014/main" id="{CA1AD984-41BA-E450-6DEC-7DA609547E4B}"/>
+              </a:ext>
+            </a:extLst>
+          </p:cNvPr>
+          <p:cNvCxnSpPr>
+            <a:cxnSpLocks/>
+          </p:cNvCxnSpPr>
+          <p:nvPr/>
+        </p:nvCxnSpPr>
+        <p:spPr>
+          <a:xfrm flipH="1" flipV="1">
+            <a:off x="5057169" y="1408320"/>
+            <a:ext cx="3097016" cy="7616"/>
+          </a:xfrm>
+          <a:prstGeom prst="straightConnector1">
+            <a:avLst/>
+          </a:prstGeom>
+          <a:ln>
+            <a:tailEnd type="triangle"/>
+          </a:ln>
+        </p:spPr>
+        <p:style>
+          <a:lnRef idx="1">
+            <a:schemeClr val="dk1"/>
+          </a:lnRef>
+          <a:fillRef idx="0">
+            <a:schemeClr val="dk1"/>
+          </a:fillRef>
+          <a:effectRef idx="0">
+            <a:schemeClr val="dk1"/>
+          </a:effectRef>
+          <a:fontRef idx="minor">
+            <a:schemeClr val="tx1"/>
+          </a:fontRef>
+        </p:style>
+      </p:cxnSp>
+      <p:sp>
+        <p:nvSpPr>
+          <p:cNvPr id="204" name="TextBox 203">
+            <a:extLst>
+              <a:ext uri="{FF2B5EF4-FFF2-40B4-BE49-F238E27FC236}">
+                <a16:creationId xmlns:a16="http://schemas.microsoft.com/office/drawing/2014/main" id="{3A2F8039-05DD-0B92-66FB-01EB4178D52F}"/>
+              </a:ext>
+            </a:extLst>
+          </p:cNvPr>
+          <p:cNvSpPr txBox="1"/>
+          <p:nvPr/>
+        </p:nvSpPr>
+        <p:spPr>
+          <a:xfrm>
+            <a:off x="5145172" y="1139814"/>
+            <a:ext cx="1467902" cy="276999"/>
+          </a:xfrm>
+          <a:prstGeom prst="rect">
+            <a:avLst/>
+          </a:prstGeom>
+          <a:noFill/>
+        </p:spPr>
+        <p:txBody>
+          <a:bodyPr wrap="none" rtlCol="0">
+            <a:spAutoFit/>
+          </a:bodyPr>
+          <a:lstStyle/>
+          <a:p>
+            <a:r>
+              <a:rPr lang="en-US" sz="1200" dirty="0"/>
+              <a:t>Reject if invalid code</a:t>
+            </a:r>
+          </a:p>
+        </p:txBody>
+      </p:sp>
+      <p:sp>
+        <p:nvSpPr>
+          <p:cNvPr id="205" name="TextBox 204">
+            <a:extLst>
+              <a:ext uri="{FF2B5EF4-FFF2-40B4-BE49-F238E27FC236}">
+                <a16:creationId xmlns:a16="http://schemas.microsoft.com/office/drawing/2014/main" id="{C477CE17-E920-DF83-2048-4ABAB5B0B700}"/>
+              </a:ext>
+            </a:extLst>
+          </p:cNvPr>
+          <p:cNvSpPr txBox="1"/>
+          <p:nvPr/>
+        </p:nvSpPr>
+        <p:spPr>
+          <a:xfrm>
+            <a:off x="489907" y="6070862"/>
+            <a:ext cx="3728906" cy="369332"/>
+          </a:xfrm>
+          <a:prstGeom prst="rect">
+            <a:avLst/>
+          </a:prstGeom>
+          <a:noFill/>
+        </p:spPr>
+        <p:txBody>
+          <a:bodyPr wrap="none" rtlCol="0">
+            <a:spAutoFit/>
+          </a:bodyPr>
+          <a:lstStyle/>
+          <a:p>
+            <a:r>
+              <a:rPr lang="en-US" dirty="0"/>
+              <a:t>Create and Access to Chat Application</a:t>
+            </a:r>
+          </a:p>
+        </p:txBody>
+      </p:sp>
+      <p:sp>
+        <p:nvSpPr>
+          <p:cNvPr id="206" name="TextBox 205">
+            <a:extLst>
+              <a:ext uri="{FF2B5EF4-FFF2-40B4-BE49-F238E27FC236}">
+                <a16:creationId xmlns:a16="http://schemas.microsoft.com/office/drawing/2014/main" id="{7BD905F6-0B8C-471D-9603-FC481FF6E361}"/>
+              </a:ext>
+            </a:extLst>
+          </p:cNvPr>
+          <p:cNvSpPr txBox="1"/>
+          <p:nvPr/>
+        </p:nvSpPr>
+        <p:spPr>
+          <a:xfrm>
+            <a:off x="2327805" y="500007"/>
+            <a:ext cx="1418849" cy="707886"/>
+          </a:xfrm>
+          <a:prstGeom prst="rect">
+            <a:avLst/>
+          </a:prstGeom>
+        </p:spPr>
+        <p:style>
+          <a:lnRef idx="3">
+            <a:schemeClr val="lt1"/>
+          </a:lnRef>
+          <a:fillRef idx="1">
+            <a:schemeClr val="accent1"/>
+          </a:fillRef>
+          <a:effectRef idx="1">
+            <a:schemeClr val="accent1"/>
+          </a:effectRef>
+          <a:fontRef idx="minor">
+            <a:schemeClr val="lt1"/>
+          </a:fontRef>
+        </p:style>
+        <p:txBody>
+          <a:bodyPr wrap="square" rtlCol="0">
+            <a:spAutoFit/>
+          </a:bodyPr>
+          <a:lstStyle/>
+          <a:p>
+            <a:r>
+              <a:rPr lang="en-US" sz="1000" dirty="0"/>
+              <a:t>{ </a:t>
+            </a:r>
+            <a:br>
+              <a:rPr lang="en-US" sz="1000" dirty="0"/>
+            </a:br>
+            <a:r>
+              <a:rPr lang="en-US" sz="1000" dirty="0"/>
+              <a:t>    “username”: “user1”,</a:t>
+            </a:r>
+          </a:p>
+          <a:p>
+            <a:r>
+              <a:rPr lang="en-US" sz="1000" dirty="0"/>
+              <a:t>    “</a:t>
+            </a:r>
+            <a:r>
+              <a:rPr lang="en-US" sz="1000" dirty="0" err="1"/>
+              <a:t>fullName</a:t>
+            </a:r>
+            <a:r>
+              <a:rPr lang="en-US" sz="1000" dirty="0"/>
+              <a:t>”: “user1”</a:t>
+            </a:r>
+          </a:p>
+          <a:p>
+            <a:r>
+              <a:rPr lang="en-US" sz="1000" dirty="0"/>
+              <a:t>}</a:t>
+            </a:r>
+          </a:p>
+        </p:txBody>
+      </p:sp>
+      <p:sp>
+        <p:nvSpPr>
+          <p:cNvPr id="207" name="Rectangle 206">
+            <a:extLst>
+              <a:ext uri="{FF2B5EF4-FFF2-40B4-BE49-F238E27FC236}">
+                <a16:creationId xmlns:a16="http://schemas.microsoft.com/office/drawing/2014/main" id="{6470F8CA-E245-8252-82A0-B43AB673ACF3}"/>
+              </a:ext>
+            </a:extLst>
+          </p:cNvPr>
+          <p:cNvSpPr/>
+          <p:nvPr/>
+        </p:nvSpPr>
+        <p:spPr>
+          <a:xfrm>
+            <a:off x="1016183" y="2325007"/>
+            <a:ext cx="1329180" cy="556181"/>
+          </a:xfrm>
+          <a:prstGeom prst="rect">
+            <a:avLst/>
+          </a:prstGeom>
+        </p:spPr>
+        <p:style>
+          <a:lnRef idx="2">
+            <a:schemeClr val="dk1"/>
+          </a:lnRef>
+          <a:fillRef idx="1">
+            <a:schemeClr val="lt1"/>
+          </a:fillRef>
+          <a:effectRef idx="0">
+            <a:schemeClr val="dk1"/>
+          </a:effectRef>
+          <a:fontRef idx="minor">
+            <a:schemeClr val="dk1"/>
+          </a:fontRef>
+        </p:style>
+        <p:txBody>
+          <a:bodyPr rtlCol="0" anchor="ctr"/>
+          <a:lstStyle/>
+          <a:p>
+            <a:pPr algn="ctr"/>
+            <a:r>
+              <a:rPr lang="en-US" sz="1600" dirty="0"/>
+              <a:t>Message service</a:t>
+            </a:r>
+          </a:p>
+        </p:txBody>
+      </p:sp>
+      <p:sp>
+        <p:nvSpPr>
+          <p:cNvPr id="208" name="Cylinder 207">
+            <a:extLst>
+              <a:ext uri="{FF2B5EF4-FFF2-40B4-BE49-F238E27FC236}">
+                <a16:creationId xmlns:a16="http://schemas.microsoft.com/office/drawing/2014/main" id="{6275447E-7373-5220-BFB6-D1DC2E7F980E}"/>
+              </a:ext>
+            </a:extLst>
+          </p:cNvPr>
+          <p:cNvSpPr/>
+          <p:nvPr/>
+        </p:nvSpPr>
+        <p:spPr>
+          <a:xfrm>
+            <a:off x="1223573" y="4548678"/>
+            <a:ext cx="914400" cy="1216152"/>
+          </a:xfrm>
+          <a:prstGeom prst="can">
+            <a:avLst/>
+          </a:prstGeom>
+        </p:spPr>
+        <p:style>
+          <a:lnRef idx="2">
+            <a:schemeClr val="dk1"/>
+          </a:lnRef>
+          <a:fillRef idx="1">
+            <a:schemeClr val="lt1"/>
+          </a:fillRef>
+          <a:effectRef idx="0">
+            <a:schemeClr val="dk1"/>
+          </a:effectRef>
+          <a:fontRef idx="minor">
+            <a:schemeClr val="dk1"/>
+          </a:fontRef>
+        </p:style>
+        <p:txBody>
+          <a:bodyPr rtlCol="0" anchor="ctr"/>
+          <a:lstStyle/>
+          <a:p>
+            <a:pPr algn="ctr"/>
+            <a:r>
+              <a:rPr lang="en-US" sz="1200" dirty="0"/>
+              <a:t>Database</a:t>
+            </a:r>
+          </a:p>
+        </p:txBody>
+      </p:sp>
+      <p:sp>
+        <p:nvSpPr>
+          <p:cNvPr id="212" name="Diamond 211">
+            <a:extLst>
+              <a:ext uri="{FF2B5EF4-FFF2-40B4-BE49-F238E27FC236}">
+                <a16:creationId xmlns:a16="http://schemas.microsoft.com/office/drawing/2014/main" id="{F7CF1081-0294-91E8-81CC-150F9634BA52}"/>
+              </a:ext>
+            </a:extLst>
+          </p:cNvPr>
+          <p:cNvSpPr/>
+          <p:nvPr/>
+        </p:nvSpPr>
+        <p:spPr>
+          <a:xfrm>
+            <a:off x="1089835" y="1052220"/>
+            <a:ext cx="1193377" cy="737467"/>
+          </a:xfrm>
+          <a:prstGeom prst="diamond">
+            <a:avLst/>
+          </a:prstGeom>
+        </p:spPr>
+        <p:style>
+          <a:lnRef idx="2">
+            <a:schemeClr val="dk1"/>
+          </a:lnRef>
+          <a:fillRef idx="1">
+            <a:schemeClr val="lt1"/>
+          </a:fillRef>
+          <a:effectRef idx="0">
+            <a:schemeClr val="dk1"/>
+          </a:effectRef>
+          <a:fontRef idx="minor">
+            <a:schemeClr val="dk1"/>
+          </a:fontRef>
+        </p:style>
+        <p:txBody>
+          <a:bodyPr rtlCol="0" anchor="ctr"/>
+          <a:lstStyle/>
+          <a:p>
+            <a:pPr algn="ctr"/>
+            <a:r>
+              <a:rPr lang="en-US" sz="1100" dirty="0"/>
+              <a:t>Create user</a:t>
+            </a:r>
+          </a:p>
+        </p:txBody>
+      </p:sp>
+      <p:sp>
+        <p:nvSpPr>
+          <p:cNvPr id="213" name="Diamond 212">
+            <a:extLst>
+              <a:ext uri="{FF2B5EF4-FFF2-40B4-BE49-F238E27FC236}">
+                <a16:creationId xmlns:a16="http://schemas.microsoft.com/office/drawing/2014/main" id="{176F2DB8-9EE8-B2B2-38B7-A777167185A4}"/>
+              </a:ext>
+            </a:extLst>
+          </p:cNvPr>
+          <p:cNvSpPr/>
+          <p:nvPr/>
+        </p:nvSpPr>
+        <p:spPr>
+          <a:xfrm>
+            <a:off x="978784" y="3347598"/>
+            <a:ext cx="1403977" cy="727699"/>
+          </a:xfrm>
+          <a:prstGeom prst="diamond">
+            <a:avLst/>
+          </a:prstGeom>
+        </p:spPr>
+        <p:style>
+          <a:lnRef idx="2">
+            <a:schemeClr val="dk1"/>
+          </a:lnRef>
+          <a:fillRef idx="1">
+            <a:schemeClr val="lt1"/>
+          </a:fillRef>
+          <a:effectRef idx="0">
+            <a:schemeClr val="dk1"/>
+          </a:effectRef>
+          <a:fontRef idx="minor">
+            <a:schemeClr val="dk1"/>
+          </a:fontRef>
+        </p:style>
+        <p:txBody>
+          <a:bodyPr rtlCol="0" anchor="ctr"/>
+          <a:lstStyle/>
+          <a:p>
+            <a:pPr algn="ctr"/>
+            <a:r>
+              <a:rPr lang="en-US" sz="1100" dirty="0"/>
+              <a:t>Generate user code</a:t>
+            </a:r>
+          </a:p>
+        </p:txBody>
+      </p:sp>
+      <p:cxnSp>
+        <p:nvCxnSpPr>
+          <p:cNvPr id="218" name="Straight Arrow Connector 217">
+            <a:extLst>
+              <a:ext uri="{FF2B5EF4-FFF2-40B4-BE49-F238E27FC236}">
+                <a16:creationId xmlns:a16="http://schemas.microsoft.com/office/drawing/2014/main" id="{33826D81-E192-0580-8327-CD0096A8DCDA}"/>
+              </a:ext>
+            </a:extLst>
+          </p:cNvPr>
+          <p:cNvCxnSpPr>
+            <a:cxnSpLocks/>
+          </p:cNvCxnSpPr>
+          <p:nvPr/>
+        </p:nvCxnSpPr>
+        <p:spPr>
+          <a:xfrm flipH="1">
+            <a:off x="2048419" y="1552997"/>
+            <a:ext cx="5751" cy="763971"/>
+          </a:xfrm>
+          <a:prstGeom prst="straightConnector1">
+            <a:avLst/>
+          </a:prstGeom>
+          <a:ln>
+            <a:tailEnd type="triangle"/>
+          </a:ln>
+        </p:spPr>
+        <p:style>
+          <a:lnRef idx="1">
+            <a:schemeClr val="dk1"/>
+          </a:lnRef>
+          <a:fillRef idx="0">
+            <a:schemeClr val="dk1"/>
+          </a:fillRef>
+          <a:effectRef idx="0">
+            <a:schemeClr val="dk1"/>
+          </a:effectRef>
+          <a:fontRef idx="minor">
+            <a:schemeClr val="tx1"/>
+          </a:fontRef>
+        </p:style>
+      </p:cxnSp>
+      <p:cxnSp>
+        <p:nvCxnSpPr>
+          <p:cNvPr id="220" name="Straight Arrow Connector 219">
+            <a:extLst>
+              <a:ext uri="{FF2B5EF4-FFF2-40B4-BE49-F238E27FC236}">
+                <a16:creationId xmlns:a16="http://schemas.microsoft.com/office/drawing/2014/main" id="{310B189D-A3B5-9DB6-8AF1-A6890B10721B}"/>
+              </a:ext>
+            </a:extLst>
+          </p:cNvPr>
+          <p:cNvCxnSpPr>
+            <a:cxnSpLocks/>
+          </p:cNvCxnSpPr>
+          <p:nvPr/>
+        </p:nvCxnSpPr>
+        <p:spPr>
+          <a:xfrm>
+            <a:off x="2048419" y="2889227"/>
+            <a:ext cx="0" cy="655867"/>
+          </a:xfrm>
+          <a:prstGeom prst="straightConnector1">
+            <a:avLst/>
+          </a:prstGeom>
+          <a:ln>
+            <a:tailEnd type="triangle"/>
+          </a:ln>
+        </p:spPr>
+        <p:style>
+          <a:lnRef idx="1">
+            <a:schemeClr val="dk1"/>
+          </a:lnRef>
+          <a:fillRef idx="0">
+            <a:schemeClr val="dk1"/>
+          </a:fillRef>
+          <a:effectRef idx="0">
+            <a:schemeClr val="dk1"/>
+          </a:effectRef>
+          <a:fontRef idx="minor">
+            <a:schemeClr val="tx1"/>
+          </a:fontRef>
+        </p:style>
+      </p:cxnSp>
+      <p:cxnSp>
+        <p:nvCxnSpPr>
+          <p:cNvPr id="222" name="Straight Arrow Connector 221">
+            <a:extLst>
+              <a:ext uri="{FF2B5EF4-FFF2-40B4-BE49-F238E27FC236}">
+                <a16:creationId xmlns:a16="http://schemas.microsoft.com/office/drawing/2014/main" id="{1B84D30E-906A-6603-EF67-F24F36886F90}"/>
+              </a:ext>
+            </a:extLst>
+          </p:cNvPr>
+          <p:cNvCxnSpPr>
+            <a:cxnSpLocks/>
+          </p:cNvCxnSpPr>
+          <p:nvPr/>
+        </p:nvCxnSpPr>
+        <p:spPr>
+          <a:xfrm flipV="1">
+            <a:off x="1303361" y="2881188"/>
+            <a:ext cx="0" cy="655867"/>
+          </a:xfrm>
+          <a:prstGeom prst="straightConnector1">
+            <a:avLst/>
+          </a:prstGeom>
+          <a:ln>
+            <a:tailEnd type="triangle"/>
+          </a:ln>
+        </p:spPr>
+        <p:style>
+          <a:lnRef idx="1">
+            <a:schemeClr val="dk1"/>
+          </a:lnRef>
+          <a:fillRef idx="0">
+            <a:schemeClr val="dk1"/>
+          </a:fillRef>
+          <a:effectRef idx="0">
+            <a:schemeClr val="dk1"/>
+          </a:effectRef>
+          <a:fontRef idx="minor">
+            <a:schemeClr val="tx1"/>
+          </a:fontRef>
+        </p:style>
+      </p:cxnSp>
+      <p:cxnSp>
+        <p:nvCxnSpPr>
+          <p:cNvPr id="224" name="Straight Arrow Connector 223">
+            <a:extLst>
+              <a:ext uri="{FF2B5EF4-FFF2-40B4-BE49-F238E27FC236}">
+                <a16:creationId xmlns:a16="http://schemas.microsoft.com/office/drawing/2014/main" id="{5E5BF266-B41C-CAE4-518F-618991134D4C}"/>
+              </a:ext>
+            </a:extLst>
+          </p:cNvPr>
+          <p:cNvCxnSpPr>
+            <a:cxnSpLocks/>
+          </p:cNvCxnSpPr>
+          <p:nvPr/>
+        </p:nvCxnSpPr>
+        <p:spPr>
+          <a:xfrm flipH="1" flipV="1">
+            <a:off x="1297139" y="1543810"/>
+            <a:ext cx="5751" cy="763971"/>
+          </a:xfrm>
+          <a:prstGeom prst="straightConnector1">
+            <a:avLst/>
+          </a:prstGeom>
+          <a:ln>
+            <a:tailEnd type="triangle"/>
+          </a:ln>
+        </p:spPr>
+        <p:style>
+          <a:lnRef idx="1">
+            <a:schemeClr val="dk1"/>
+          </a:lnRef>
+          <a:fillRef idx="0">
+            <a:schemeClr val="dk1"/>
+          </a:fillRef>
+          <a:effectRef idx="0">
+            <a:schemeClr val="dk1"/>
+          </a:effectRef>
+          <a:fontRef idx="minor">
+            <a:schemeClr val="tx1"/>
+          </a:fontRef>
+        </p:style>
+      </p:cxnSp>
+      <p:cxnSp>
+        <p:nvCxnSpPr>
+          <p:cNvPr id="226" name="Straight Arrow Connector 225">
+            <a:extLst>
+              <a:ext uri="{FF2B5EF4-FFF2-40B4-BE49-F238E27FC236}">
+                <a16:creationId xmlns:a16="http://schemas.microsoft.com/office/drawing/2014/main" id="{7E2284DC-4DF0-B5CA-0ADD-9780B801A4D7}"/>
+              </a:ext>
+            </a:extLst>
+          </p:cNvPr>
+          <p:cNvCxnSpPr>
+            <a:stCxn id="213" idx="2"/>
+            <a:endCxn id="208" idx="1"/>
+          </p:cNvCxnSpPr>
+          <p:nvPr/>
+        </p:nvCxnSpPr>
+        <p:spPr>
+          <a:xfrm>
+            <a:off x="1680773" y="4075297"/>
+            <a:ext cx="0" cy="473381"/>
+          </a:xfrm>
+          <a:prstGeom prst="straightConnector1">
+            <a:avLst/>
+          </a:prstGeom>
+          <a:ln>
+            <a:tailEnd type="triangle"/>
+          </a:ln>
+        </p:spPr>
+        <p:style>
+          <a:lnRef idx="1">
+            <a:schemeClr val="dk1"/>
+          </a:lnRef>
+          <a:fillRef idx="0">
+            <a:schemeClr val="dk1"/>
+          </a:fillRef>
+          <a:effectRef idx="0">
+            <a:schemeClr val="dk1"/>
+          </a:effectRef>
+          <a:fontRef idx="minor">
+            <a:schemeClr val="tx1"/>
+          </a:fontRef>
+        </p:style>
+      </p:cxnSp>
+      <p:sp>
+        <p:nvSpPr>
+          <p:cNvPr id="227" name="TextBox 226">
+            <a:extLst>
+              <a:ext uri="{FF2B5EF4-FFF2-40B4-BE49-F238E27FC236}">
+                <a16:creationId xmlns:a16="http://schemas.microsoft.com/office/drawing/2014/main" id="{19A49EAC-B92B-F4AF-96C5-24DC27FCD9E2}"/>
+              </a:ext>
+            </a:extLst>
+          </p:cNvPr>
+          <p:cNvSpPr txBox="1"/>
+          <p:nvPr/>
+        </p:nvSpPr>
+        <p:spPr>
+          <a:xfrm>
+            <a:off x="1684623" y="4089813"/>
+            <a:ext cx="470770" cy="276999"/>
+          </a:xfrm>
+          <a:prstGeom prst="rect">
+            <a:avLst/>
+          </a:prstGeom>
+          <a:noFill/>
+        </p:spPr>
+        <p:txBody>
+          <a:bodyPr wrap="none" rtlCol="0">
+            <a:spAutoFit/>
+          </a:bodyPr>
+          <a:lstStyle/>
+          <a:p>
+            <a:r>
+              <a:rPr lang="en-US" sz="1200" dirty="0"/>
+              <a:t>Save</a:t>
+            </a:r>
+          </a:p>
+        </p:txBody>
+      </p:sp>
+      <p:sp>
+        <p:nvSpPr>
+          <p:cNvPr id="228" name="TextBox 227">
+            <a:extLst>
+              <a:ext uri="{FF2B5EF4-FFF2-40B4-BE49-F238E27FC236}">
+                <a16:creationId xmlns:a16="http://schemas.microsoft.com/office/drawing/2014/main" id="{8CD518BE-990A-EB6A-6AAF-129959D2D6C7}"/>
+              </a:ext>
+            </a:extLst>
+          </p:cNvPr>
+          <p:cNvSpPr txBox="1"/>
+          <p:nvPr/>
+        </p:nvSpPr>
+        <p:spPr>
+          <a:xfrm>
+            <a:off x="2052475" y="3160770"/>
+            <a:ext cx="689997" cy="276999"/>
+          </a:xfrm>
+          <a:prstGeom prst="rect">
+            <a:avLst/>
+          </a:prstGeom>
+          <a:noFill/>
+        </p:spPr>
+        <p:txBody>
+          <a:bodyPr wrap="none" rtlCol="0">
+            <a:spAutoFit/>
+          </a:bodyPr>
+          <a:lstStyle/>
+          <a:p>
+            <a:r>
+              <a:rPr lang="en-US" sz="1200" dirty="0"/>
+              <a:t>Request</a:t>
+            </a:r>
+          </a:p>
+        </p:txBody>
+      </p:sp>
+      <p:sp>
+        <p:nvSpPr>
+          <p:cNvPr id="229" name="TextBox 228">
+            <a:extLst>
+              <a:ext uri="{FF2B5EF4-FFF2-40B4-BE49-F238E27FC236}">
+                <a16:creationId xmlns:a16="http://schemas.microsoft.com/office/drawing/2014/main" id="{98EF0DA3-981C-822F-3655-F26C45F8BFD7}"/>
+              </a:ext>
+            </a:extLst>
+          </p:cNvPr>
+          <p:cNvSpPr txBox="1"/>
+          <p:nvPr/>
+        </p:nvSpPr>
+        <p:spPr>
+          <a:xfrm>
+            <a:off x="528811" y="2928903"/>
+            <a:ext cx="783099" cy="276999"/>
+          </a:xfrm>
+          <a:prstGeom prst="rect">
+            <a:avLst/>
+          </a:prstGeom>
+          <a:noFill/>
+        </p:spPr>
+        <p:txBody>
+          <a:bodyPr wrap="none" rtlCol="0">
+            <a:spAutoFit/>
+          </a:bodyPr>
+          <a:lstStyle/>
+          <a:p>
+            <a:r>
+              <a:rPr lang="en-US" sz="1200" dirty="0"/>
+              <a:t>Response</a:t>
+            </a:r>
+          </a:p>
+        </p:txBody>
+      </p:sp>
+      <p:sp>
+        <p:nvSpPr>
+          <p:cNvPr id="231" name="TextBox 230">
+            <a:extLst>
+              <a:ext uri="{FF2B5EF4-FFF2-40B4-BE49-F238E27FC236}">
+                <a16:creationId xmlns:a16="http://schemas.microsoft.com/office/drawing/2014/main" id="{0E4155A1-628E-658A-2DF8-F8A9164D58DA}"/>
+              </a:ext>
+            </a:extLst>
+          </p:cNvPr>
+          <p:cNvSpPr txBox="1"/>
+          <p:nvPr/>
+        </p:nvSpPr>
+        <p:spPr>
+          <a:xfrm>
+            <a:off x="2065749" y="2000293"/>
+            <a:ext cx="689997" cy="276999"/>
+          </a:xfrm>
+          <a:prstGeom prst="rect">
+            <a:avLst/>
+          </a:prstGeom>
+          <a:noFill/>
+        </p:spPr>
+        <p:txBody>
+          <a:bodyPr wrap="none" rtlCol="0">
+            <a:spAutoFit/>
+          </a:bodyPr>
+          <a:lstStyle/>
+          <a:p>
+            <a:r>
+              <a:rPr lang="en-US" sz="1200" dirty="0"/>
+              <a:t>Request</a:t>
+            </a:r>
+          </a:p>
+        </p:txBody>
+      </p:sp>
+      <p:sp>
+        <p:nvSpPr>
+          <p:cNvPr id="232" name="TextBox 231">
+            <a:extLst>
+              <a:ext uri="{FF2B5EF4-FFF2-40B4-BE49-F238E27FC236}">
+                <a16:creationId xmlns:a16="http://schemas.microsoft.com/office/drawing/2014/main" id="{DEBA1CF6-BB3A-44FD-BC22-B100CBBE162D}"/>
+              </a:ext>
+            </a:extLst>
+          </p:cNvPr>
+          <p:cNvSpPr txBox="1"/>
+          <p:nvPr/>
+        </p:nvSpPr>
+        <p:spPr>
+          <a:xfrm>
+            <a:off x="455609" y="1581598"/>
+            <a:ext cx="813364" cy="276999"/>
+          </a:xfrm>
+          <a:prstGeom prst="rect">
+            <a:avLst/>
+          </a:prstGeom>
+          <a:noFill/>
+        </p:spPr>
+        <p:txBody>
+          <a:bodyPr wrap="none" rtlCol="0">
+            <a:spAutoFit/>
+          </a:bodyPr>
+          <a:lstStyle/>
+          <a:p>
+            <a:r>
+              <a:rPr lang="en-US" sz="1200" dirty="0"/>
+              <a:t>User code</a:t>
+            </a:r>
+          </a:p>
+        </p:txBody>
+      </p:sp>
+      <p:cxnSp>
+        <p:nvCxnSpPr>
+          <p:cNvPr id="233" name="Straight Arrow Connector 232">
+            <a:extLst>
+              <a:ext uri="{FF2B5EF4-FFF2-40B4-BE49-F238E27FC236}">
+                <a16:creationId xmlns:a16="http://schemas.microsoft.com/office/drawing/2014/main" id="{57AC93B9-3C24-EB4E-8E85-9B1A6F5A0533}"/>
+              </a:ext>
+            </a:extLst>
+          </p:cNvPr>
+          <p:cNvCxnSpPr>
+            <a:cxnSpLocks/>
+          </p:cNvCxnSpPr>
+          <p:nvPr/>
+        </p:nvCxnSpPr>
+        <p:spPr>
+          <a:xfrm flipV="1">
+            <a:off x="2280648" y="1412128"/>
+            <a:ext cx="1811986" cy="3928"/>
+          </a:xfrm>
+          <a:prstGeom prst="straightConnector1">
+            <a:avLst/>
+          </a:prstGeom>
+          <a:ln>
+            <a:headEnd type="triangle"/>
+            <a:tailEnd type="triangle"/>
+          </a:ln>
+        </p:spPr>
+        <p:style>
+          <a:lnRef idx="2">
+            <a:schemeClr val="dk1"/>
+          </a:lnRef>
+          <a:fillRef idx="0">
+            <a:schemeClr val="dk1"/>
+          </a:fillRef>
+          <a:effectRef idx="1">
+            <a:schemeClr val="dk1"/>
+          </a:effectRef>
+          <a:fontRef idx="minor">
+            <a:schemeClr val="tx1"/>
+          </a:fontRef>
+        </p:style>
+      </p:cxnSp>
     </p:spTree>
     <p:extLst>
       <p:ext uri="{BB962C8B-B14F-4D97-AF65-F5344CB8AC3E}">
         <p14:creationId xmlns:p14="http://schemas.microsoft.com/office/powerpoint/2010/main" val="2758663255"/>
+      </p:ext>
+    </p:extLst>
+  </p:cSld>
+  <p:clrMapOvr>
+    <a:masterClrMapping/>
+  </p:clrMapOvr>
+</p:sld>
+</file>
+
+<file path=ppt/slides/slide5.xml><?xml version="1.0" encoding="utf-8"?>
+<p:sld xmlns:a="http://schemas.openxmlformats.org/drawingml/2006/main" xmlns:r="http://schemas.openxmlformats.org/officeDocument/2006/relationships" xmlns:p="http://schemas.openxmlformats.org/presentationml/2006/main">
+  <p:cSld>
+    <p:spTree>
+      <p:nvGrpSpPr>
+        <p:cNvPr id="1" name=""/>
+        <p:cNvGrpSpPr/>
+        <p:nvPr/>
+      </p:nvGrpSpPr>
+      <p:grpSpPr>
+        <a:xfrm>
+          <a:off x="0" y="0"/>
+          <a:ext cx="0" cy="0"/>
+          <a:chOff x="0" y="0"/>
+          <a:chExt cx="0" cy="0"/>
+        </a:xfrm>
+      </p:grpSpPr>
+      <p:sp>
+        <p:nvSpPr>
+          <p:cNvPr id="2" name="Title 1">
+            <a:extLst>
+              <a:ext uri="{FF2B5EF4-FFF2-40B4-BE49-F238E27FC236}">
+                <a16:creationId xmlns:a16="http://schemas.microsoft.com/office/drawing/2014/main" id="{FDAB91D6-C3B0-0E8F-E242-40DF8BFE836F}"/>
+              </a:ext>
+            </a:extLst>
+          </p:cNvPr>
+          <p:cNvSpPr>
+            <a:spLocks noGrp="1"/>
+          </p:cNvSpPr>
+          <p:nvPr>
+            <p:ph type="title"/>
+          </p:nvPr>
+        </p:nvSpPr>
+        <p:spPr/>
+        <p:txBody>
+          <a:bodyPr/>
+          <a:lstStyle/>
+          <a:p>
+            <a:endParaRPr lang="en-US"/>
+          </a:p>
+        </p:txBody>
+      </p:sp>
+      <p:sp>
+        <p:nvSpPr>
+          <p:cNvPr id="3" name="Content Placeholder 2">
+            <a:extLst>
+              <a:ext uri="{FF2B5EF4-FFF2-40B4-BE49-F238E27FC236}">
+                <a16:creationId xmlns:a16="http://schemas.microsoft.com/office/drawing/2014/main" id="{198F5036-D7C2-27F3-1921-FFFD85697E4C}"/>
+              </a:ext>
+            </a:extLst>
+          </p:cNvPr>
+          <p:cNvSpPr>
+            <a:spLocks noGrp="1"/>
+          </p:cNvSpPr>
+          <p:nvPr>
+            <p:ph idx="1"/>
+          </p:nvPr>
+        </p:nvSpPr>
+        <p:spPr/>
+        <p:txBody>
+          <a:bodyPr/>
+          <a:lstStyle/>
+          <a:p>
+            <a:endParaRPr lang="en-US"/>
+          </a:p>
+        </p:txBody>
+      </p:sp>
+    </p:spTree>
+    <p:extLst>
+      <p:ext uri="{BB962C8B-B14F-4D97-AF65-F5344CB8AC3E}">
+        <p14:creationId xmlns:p14="http://schemas.microsoft.com/office/powerpoint/2010/main" val="1569354273"/>
       </p:ext>
     </p:extLst>
   </p:cSld>

</xml_diff>

<commit_message>
TRACK-2 update send mail with verify code
</commit_message>
<xml_diff>
--- a/img/MessageService.pptx
+++ b/img/MessageService.pptx
@@ -694,7 +694,7 @@
           <a:p>
             <a:fld id="{FB49B6D9-76A2-4273-8898-41BA7861568C}" type="datetimeFigureOut">
               <a:rPr lang="en-US" smtClean="0"/>
-              <a:t>6/8/2025</a:t>
+              <a:t>6/11/2025</a:t>
             </a:fld>
             <a:endParaRPr lang="en-US"/>
           </a:p>
@@ -1192,7 +1192,7 @@
           <a:p>
             <a:fld id="{F06B3324-A130-486E-B399-F13CFE9C01D2}" type="datetimeFigureOut">
               <a:rPr lang="en-US" smtClean="0"/>
-              <a:t>6/8/2025</a:t>
+              <a:t>6/11/2025</a:t>
             </a:fld>
             <a:endParaRPr lang="en-US"/>
           </a:p>
@@ -1390,7 +1390,7 @@
           <a:p>
             <a:fld id="{F06B3324-A130-486E-B399-F13CFE9C01D2}" type="datetimeFigureOut">
               <a:rPr lang="en-US" smtClean="0"/>
-              <a:t>6/8/2025</a:t>
+              <a:t>6/11/2025</a:t>
             </a:fld>
             <a:endParaRPr lang="en-US"/>
           </a:p>
@@ -1598,7 +1598,7 @@
           <a:p>
             <a:fld id="{F06B3324-A130-486E-B399-F13CFE9C01D2}" type="datetimeFigureOut">
               <a:rPr lang="en-US" smtClean="0"/>
-              <a:t>6/8/2025</a:t>
+              <a:t>6/11/2025</a:t>
             </a:fld>
             <a:endParaRPr lang="en-US"/>
           </a:p>
@@ -1796,7 +1796,7 @@
           <a:p>
             <a:fld id="{F06B3324-A130-486E-B399-F13CFE9C01D2}" type="datetimeFigureOut">
               <a:rPr lang="en-US" smtClean="0"/>
-              <a:t>6/8/2025</a:t>
+              <a:t>6/11/2025</a:t>
             </a:fld>
             <a:endParaRPr lang="en-US"/>
           </a:p>
@@ -2071,7 +2071,7 @@
           <a:p>
             <a:fld id="{F06B3324-A130-486E-B399-F13CFE9C01D2}" type="datetimeFigureOut">
               <a:rPr lang="en-US" smtClean="0"/>
-              <a:t>6/8/2025</a:t>
+              <a:t>6/11/2025</a:t>
             </a:fld>
             <a:endParaRPr lang="en-US"/>
           </a:p>
@@ -2336,7 +2336,7 @@
           <a:p>
             <a:fld id="{F06B3324-A130-486E-B399-F13CFE9C01D2}" type="datetimeFigureOut">
               <a:rPr lang="en-US" smtClean="0"/>
-              <a:t>6/8/2025</a:t>
+              <a:t>6/11/2025</a:t>
             </a:fld>
             <a:endParaRPr lang="en-US"/>
           </a:p>
@@ -2748,7 +2748,7 @@
           <a:p>
             <a:fld id="{F06B3324-A130-486E-B399-F13CFE9C01D2}" type="datetimeFigureOut">
               <a:rPr lang="en-US" smtClean="0"/>
-              <a:t>6/8/2025</a:t>
+              <a:t>6/11/2025</a:t>
             </a:fld>
             <a:endParaRPr lang="en-US"/>
           </a:p>
@@ -2889,7 +2889,7 @@
           <a:p>
             <a:fld id="{F06B3324-A130-486E-B399-F13CFE9C01D2}" type="datetimeFigureOut">
               <a:rPr lang="en-US" smtClean="0"/>
-              <a:t>6/8/2025</a:t>
+              <a:t>6/11/2025</a:t>
             </a:fld>
             <a:endParaRPr lang="en-US"/>
           </a:p>
@@ -3002,7 +3002,7 @@
           <a:p>
             <a:fld id="{F06B3324-A130-486E-B399-F13CFE9C01D2}" type="datetimeFigureOut">
               <a:rPr lang="en-US" smtClean="0"/>
-              <a:t>6/8/2025</a:t>
+              <a:t>6/11/2025</a:t>
             </a:fld>
             <a:endParaRPr lang="en-US"/>
           </a:p>
@@ -3313,7 +3313,7 @@
           <a:p>
             <a:fld id="{F06B3324-A130-486E-B399-F13CFE9C01D2}" type="datetimeFigureOut">
               <a:rPr lang="en-US" smtClean="0"/>
-              <a:t>6/8/2025</a:t>
+              <a:t>6/11/2025</a:t>
             </a:fld>
             <a:endParaRPr lang="en-US"/>
           </a:p>
@@ -3601,7 +3601,7 @@
           <a:p>
             <a:fld id="{F06B3324-A130-486E-B399-F13CFE9C01D2}" type="datetimeFigureOut">
               <a:rPr lang="en-US" smtClean="0"/>
-              <a:t>6/8/2025</a:t>
+              <a:t>6/11/2025</a:t>
             </a:fld>
             <a:endParaRPr lang="en-US"/>
           </a:p>
@@ -3842,7 +3842,7 @@
           <a:p>
             <a:fld id="{F06B3324-A130-486E-B399-F13CFE9C01D2}" type="datetimeFigureOut">
               <a:rPr lang="en-US" smtClean="0"/>
-              <a:t>6/8/2025</a:t>
+              <a:t>6/11/2025</a:t>
             </a:fld>
             <a:endParaRPr lang="en-US"/>
           </a:p>
@@ -14426,6 +14426,1372 @@
           <a:chExt cx="0" cy="0"/>
         </a:xfrm>
       </p:grpSpPr>
+      <p:sp>
+        <p:nvSpPr>
+          <p:cNvPr id="2" name="Rectangle 1">
+            <a:extLst>
+              <a:ext uri="{FF2B5EF4-FFF2-40B4-BE49-F238E27FC236}">
+                <a16:creationId xmlns:a16="http://schemas.microsoft.com/office/drawing/2014/main" id="{C2D2F550-94BC-DB82-D5C7-ACEBBA30531A}"/>
+              </a:ext>
+            </a:extLst>
+          </p:cNvPr>
+          <p:cNvSpPr/>
+          <p:nvPr/>
+        </p:nvSpPr>
+        <p:spPr>
+          <a:xfrm>
+            <a:off x="6021088" y="4250722"/>
+            <a:ext cx="1329180" cy="556181"/>
+          </a:xfrm>
+          <a:prstGeom prst="rect">
+            <a:avLst/>
+          </a:prstGeom>
+        </p:spPr>
+        <p:style>
+          <a:lnRef idx="2">
+            <a:schemeClr val="dk1"/>
+          </a:lnRef>
+          <a:fillRef idx="1">
+            <a:schemeClr val="lt1"/>
+          </a:fillRef>
+          <a:effectRef idx="0">
+            <a:schemeClr val="dk1"/>
+          </a:effectRef>
+          <a:fontRef idx="minor">
+            <a:schemeClr val="dk1"/>
+          </a:fontRef>
+        </p:style>
+        <p:txBody>
+          <a:bodyPr rtlCol="0" anchor="ctr"/>
+          <a:lstStyle/>
+          <a:p>
+            <a:pPr algn="ctr"/>
+            <a:r>
+              <a:rPr lang="en-US" sz="1600" dirty="0"/>
+              <a:t>Mail service</a:t>
+            </a:r>
+          </a:p>
+        </p:txBody>
+      </p:sp>
+      <p:sp>
+        <p:nvSpPr>
+          <p:cNvPr id="4" name="Oval 3">
+            <a:extLst>
+              <a:ext uri="{FF2B5EF4-FFF2-40B4-BE49-F238E27FC236}">
+                <a16:creationId xmlns:a16="http://schemas.microsoft.com/office/drawing/2014/main" id="{3E0E6012-86D3-2BE3-065F-770FF7A909BC}"/>
+              </a:ext>
+            </a:extLst>
+          </p:cNvPr>
+          <p:cNvSpPr/>
+          <p:nvPr/>
+        </p:nvSpPr>
+        <p:spPr>
+          <a:xfrm>
+            <a:off x="2406821" y="2059762"/>
+            <a:ext cx="282804" cy="292231"/>
+          </a:xfrm>
+          <a:prstGeom prst="ellipse">
+            <a:avLst/>
+          </a:prstGeom>
+        </p:spPr>
+        <p:style>
+          <a:lnRef idx="2">
+            <a:schemeClr val="accent1">
+              <a:shade val="15000"/>
+            </a:schemeClr>
+          </a:lnRef>
+          <a:fillRef idx="1">
+            <a:schemeClr val="accent1"/>
+          </a:fillRef>
+          <a:effectRef idx="0">
+            <a:schemeClr val="accent1"/>
+          </a:effectRef>
+          <a:fontRef idx="minor">
+            <a:schemeClr val="lt1"/>
+          </a:fontRef>
+        </p:style>
+        <p:txBody>
+          <a:bodyPr rtlCol="0" anchor="ctr"/>
+          <a:lstStyle/>
+          <a:p>
+            <a:pPr algn="ctr"/>
+            <a:endParaRPr lang="en-US"/>
+          </a:p>
+        </p:txBody>
+      </p:sp>
+      <p:cxnSp>
+        <p:nvCxnSpPr>
+          <p:cNvPr id="5" name="Straight Connector 4">
+            <a:extLst>
+              <a:ext uri="{FF2B5EF4-FFF2-40B4-BE49-F238E27FC236}">
+                <a16:creationId xmlns:a16="http://schemas.microsoft.com/office/drawing/2014/main" id="{B0A2CA07-BD78-8B07-3A29-F4E7BDAEA14F}"/>
+              </a:ext>
+            </a:extLst>
+          </p:cNvPr>
+          <p:cNvCxnSpPr>
+            <a:cxnSpLocks/>
+            <a:stCxn id="4" idx="4"/>
+          </p:cNvCxnSpPr>
+          <p:nvPr/>
+        </p:nvCxnSpPr>
+        <p:spPr>
+          <a:xfrm>
+            <a:off x="2548223" y="2351993"/>
+            <a:ext cx="0" cy="499621"/>
+          </a:xfrm>
+          <a:prstGeom prst="line">
+            <a:avLst/>
+          </a:prstGeom>
+        </p:spPr>
+        <p:style>
+          <a:lnRef idx="3">
+            <a:schemeClr val="accent1"/>
+          </a:lnRef>
+          <a:fillRef idx="0">
+            <a:schemeClr val="accent1"/>
+          </a:fillRef>
+          <a:effectRef idx="2">
+            <a:schemeClr val="accent1"/>
+          </a:effectRef>
+          <a:fontRef idx="minor">
+            <a:schemeClr val="tx1"/>
+          </a:fontRef>
+        </p:style>
+      </p:cxnSp>
+      <p:cxnSp>
+        <p:nvCxnSpPr>
+          <p:cNvPr id="6" name="Straight Connector 5">
+            <a:extLst>
+              <a:ext uri="{FF2B5EF4-FFF2-40B4-BE49-F238E27FC236}">
+                <a16:creationId xmlns:a16="http://schemas.microsoft.com/office/drawing/2014/main" id="{3DC11CF6-F4CE-B7E8-8D1E-A3B6A82AEFC4}"/>
+              </a:ext>
+            </a:extLst>
+          </p:cNvPr>
+          <p:cNvCxnSpPr>
+            <a:cxnSpLocks/>
+          </p:cNvCxnSpPr>
+          <p:nvPr/>
+        </p:nvCxnSpPr>
+        <p:spPr>
+          <a:xfrm flipH="1">
+            <a:off x="2406821" y="2851614"/>
+            <a:ext cx="141402" cy="188536"/>
+          </a:xfrm>
+          <a:prstGeom prst="line">
+            <a:avLst/>
+          </a:prstGeom>
+        </p:spPr>
+        <p:style>
+          <a:lnRef idx="3">
+            <a:schemeClr val="accent1"/>
+          </a:lnRef>
+          <a:fillRef idx="0">
+            <a:schemeClr val="accent1"/>
+          </a:fillRef>
+          <a:effectRef idx="2">
+            <a:schemeClr val="accent1"/>
+          </a:effectRef>
+          <a:fontRef idx="minor">
+            <a:schemeClr val="tx1"/>
+          </a:fontRef>
+        </p:style>
+      </p:cxnSp>
+      <p:cxnSp>
+        <p:nvCxnSpPr>
+          <p:cNvPr id="7" name="Straight Connector 6">
+            <a:extLst>
+              <a:ext uri="{FF2B5EF4-FFF2-40B4-BE49-F238E27FC236}">
+                <a16:creationId xmlns:a16="http://schemas.microsoft.com/office/drawing/2014/main" id="{A0B5BF9B-72D9-4C48-6FF3-976C034E4E81}"/>
+              </a:ext>
+            </a:extLst>
+          </p:cNvPr>
+          <p:cNvCxnSpPr>
+            <a:cxnSpLocks/>
+          </p:cNvCxnSpPr>
+          <p:nvPr/>
+        </p:nvCxnSpPr>
+        <p:spPr>
+          <a:xfrm flipH="1" flipV="1">
+            <a:off x="2548223" y="2851614"/>
+            <a:ext cx="152399" cy="188536"/>
+          </a:xfrm>
+          <a:prstGeom prst="line">
+            <a:avLst/>
+          </a:prstGeom>
+        </p:spPr>
+        <p:style>
+          <a:lnRef idx="3">
+            <a:schemeClr val="accent1"/>
+          </a:lnRef>
+          <a:fillRef idx="0">
+            <a:schemeClr val="accent1"/>
+          </a:fillRef>
+          <a:effectRef idx="2">
+            <a:schemeClr val="accent1"/>
+          </a:effectRef>
+          <a:fontRef idx="minor">
+            <a:schemeClr val="tx1"/>
+          </a:fontRef>
+        </p:style>
+      </p:cxnSp>
+      <p:cxnSp>
+        <p:nvCxnSpPr>
+          <p:cNvPr id="8" name="Straight Connector 7">
+            <a:extLst>
+              <a:ext uri="{FF2B5EF4-FFF2-40B4-BE49-F238E27FC236}">
+                <a16:creationId xmlns:a16="http://schemas.microsoft.com/office/drawing/2014/main" id="{2E324E7A-05C5-6D23-06B7-B109ED710BE4}"/>
+              </a:ext>
+            </a:extLst>
+          </p:cNvPr>
+          <p:cNvCxnSpPr/>
+          <p:nvPr/>
+        </p:nvCxnSpPr>
+        <p:spPr>
+          <a:xfrm>
+            <a:off x="2331406" y="2531102"/>
+            <a:ext cx="433633" cy="0"/>
+          </a:xfrm>
+          <a:prstGeom prst="line">
+            <a:avLst/>
+          </a:prstGeom>
+        </p:spPr>
+        <p:style>
+          <a:lnRef idx="3">
+            <a:schemeClr val="accent1"/>
+          </a:lnRef>
+          <a:fillRef idx="0">
+            <a:schemeClr val="accent1"/>
+          </a:fillRef>
+          <a:effectRef idx="2">
+            <a:schemeClr val="accent1"/>
+          </a:effectRef>
+          <a:fontRef idx="minor">
+            <a:schemeClr val="tx1"/>
+          </a:fontRef>
+        </p:style>
+      </p:cxnSp>
+      <p:sp>
+        <p:nvSpPr>
+          <p:cNvPr id="10" name="TextBox 9">
+            <a:extLst>
+              <a:ext uri="{FF2B5EF4-FFF2-40B4-BE49-F238E27FC236}">
+                <a16:creationId xmlns:a16="http://schemas.microsoft.com/office/drawing/2014/main" id="{9C14414D-3BBB-D820-8D18-D649A802E824}"/>
+              </a:ext>
+            </a:extLst>
+          </p:cNvPr>
+          <p:cNvSpPr txBox="1"/>
+          <p:nvPr/>
+        </p:nvSpPr>
+        <p:spPr>
+          <a:xfrm>
+            <a:off x="1742273" y="2059762"/>
+            <a:ext cx="588623" cy="276999"/>
+          </a:xfrm>
+          <a:prstGeom prst="rect">
+            <a:avLst/>
+          </a:prstGeom>
+          <a:noFill/>
+        </p:spPr>
+        <p:txBody>
+          <a:bodyPr wrap="none" rtlCol="0">
+            <a:spAutoFit/>
+          </a:bodyPr>
+          <a:lstStyle/>
+          <a:p>
+            <a:r>
+              <a:rPr lang="en-US" sz="1200" dirty="0"/>
+              <a:t>User 1</a:t>
+            </a:r>
+          </a:p>
+        </p:txBody>
+      </p:sp>
+      <p:sp>
+        <p:nvSpPr>
+          <p:cNvPr id="11" name="Rectangle 10">
+            <a:extLst>
+              <a:ext uri="{FF2B5EF4-FFF2-40B4-BE49-F238E27FC236}">
+                <a16:creationId xmlns:a16="http://schemas.microsoft.com/office/drawing/2014/main" id="{A2D15A11-E2EF-4CB7-308E-244E4440F819}"/>
+              </a:ext>
+            </a:extLst>
+          </p:cNvPr>
+          <p:cNvSpPr/>
+          <p:nvPr/>
+        </p:nvSpPr>
+        <p:spPr>
+          <a:xfrm>
+            <a:off x="6021088" y="2244349"/>
+            <a:ext cx="1329180" cy="556181"/>
+          </a:xfrm>
+          <a:prstGeom prst="rect">
+            <a:avLst/>
+          </a:prstGeom>
+        </p:spPr>
+        <p:style>
+          <a:lnRef idx="2">
+            <a:schemeClr val="dk1"/>
+          </a:lnRef>
+          <a:fillRef idx="1">
+            <a:schemeClr val="lt1"/>
+          </a:fillRef>
+          <a:effectRef idx="0">
+            <a:schemeClr val="dk1"/>
+          </a:effectRef>
+          <a:fontRef idx="minor">
+            <a:schemeClr val="dk1"/>
+          </a:fontRef>
+        </p:style>
+        <p:txBody>
+          <a:bodyPr rtlCol="0" anchor="ctr"/>
+          <a:lstStyle/>
+          <a:p>
+            <a:pPr algn="ctr"/>
+            <a:r>
+              <a:rPr lang="en-US" sz="1600" dirty="0"/>
+              <a:t>Message service</a:t>
+            </a:r>
+          </a:p>
+        </p:txBody>
+      </p:sp>
+      <p:sp>
+        <p:nvSpPr>
+          <p:cNvPr id="12" name="Diamond 11">
+            <a:extLst>
+              <a:ext uri="{FF2B5EF4-FFF2-40B4-BE49-F238E27FC236}">
+                <a16:creationId xmlns:a16="http://schemas.microsoft.com/office/drawing/2014/main" id="{DFB5CCDA-60E5-4526-BA79-21869DE84946}"/>
+              </a:ext>
+            </a:extLst>
+          </p:cNvPr>
+          <p:cNvSpPr/>
+          <p:nvPr/>
+        </p:nvSpPr>
+        <p:spPr>
+          <a:xfrm>
+            <a:off x="3969188" y="2253011"/>
+            <a:ext cx="1215546" cy="556181"/>
+          </a:xfrm>
+          <a:prstGeom prst="diamond">
+            <a:avLst/>
+          </a:prstGeom>
+        </p:spPr>
+        <p:style>
+          <a:lnRef idx="2">
+            <a:schemeClr val="dk1"/>
+          </a:lnRef>
+          <a:fillRef idx="1">
+            <a:schemeClr val="lt1"/>
+          </a:fillRef>
+          <a:effectRef idx="0">
+            <a:schemeClr val="dk1"/>
+          </a:effectRef>
+          <a:fontRef idx="minor">
+            <a:schemeClr val="dk1"/>
+          </a:fontRef>
+        </p:style>
+        <p:txBody>
+          <a:bodyPr rtlCol="0" anchor="ctr"/>
+          <a:lstStyle/>
+          <a:p>
+            <a:pPr algn="ctr"/>
+            <a:r>
+              <a:rPr lang="en-US" sz="1100" dirty="0"/>
+              <a:t>Login</a:t>
+            </a:r>
+          </a:p>
+        </p:txBody>
+      </p:sp>
+      <p:cxnSp>
+        <p:nvCxnSpPr>
+          <p:cNvPr id="14" name="Straight Arrow Connector 13">
+            <a:extLst>
+              <a:ext uri="{FF2B5EF4-FFF2-40B4-BE49-F238E27FC236}">
+                <a16:creationId xmlns:a16="http://schemas.microsoft.com/office/drawing/2014/main" id="{381AAC75-C252-63F0-B22E-E4C631B0B30A}"/>
+              </a:ext>
+            </a:extLst>
+          </p:cNvPr>
+          <p:cNvCxnSpPr>
+            <a:stCxn id="12" idx="3"/>
+            <a:endCxn id="11" idx="1"/>
+          </p:cNvCxnSpPr>
+          <p:nvPr/>
+        </p:nvCxnSpPr>
+        <p:spPr>
+          <a:xfrm flipV="1">
+            <a:off x="5184734" y="2522440"/>
+            <a:ext cx="836354" cy="8662"/>
+          </a:xfrm>
+          <a:prstGeom prst="straightConnector1">
+            <a:avLst/>
+          </a:prstGeom>
+          <a:ln>
+            <a:tailEnd type="triangle"/>
+          </a:ln>
+        </p:spPr>
+        <p:style>
+          <a:lnRef idx="1">
+            <a:schemeClr val="dk1"/>
+          </a:lnRef>
+          <a:fillRef idx="0">
+            <a:schemeClr val="dk1"/>
+          </a:fillRef>
+          <a:effectRef idx="0">
+            <a:schemeClr val="dk1"/>
+          </a:effectRef>
+          <a:fontRef idx="minor">
+            <a:schemeClr val="tx1"/>
+          </a:fontRef>
+        </p:style>
+      </p:cxnSp>
+      <p:cxnSp>
+        <p:nvCxnSpPr>
+          <p:cNvPr id="15" name="Straight Arrow Connector 14">
+            <a:extLst>
+              <a:ext uri="{FF2B5EF4-FFF2-40B4-BE49-F238E27FC236}">
+                <a16:creationId xmlns:a16="http://schemas.microsoft.com/office/drawing/2014/main" id="{BAF03984-6AAA-0F66-437F-8FB15517EED7}"/>
+              </a:ext>
+            </a:extLst>
+          </p:cNvPr>
+          <p:cNvCxnSpPr/>
+          <p:nvPr/>
+        </p:nvCxnSpPr>
+        <p:spPr>
+          <a:xfrm flipV="1">
+            <a:off x="3132834" y="2523204"/>
+            <a:ext cx="836354" cy="8662"/>
+          </a:xfrm>
+          <a:prstGeom prst="straightConnector1">
+            <a:avLst/>
+          </a:prstGeom>
+          <a:ln>
+            <a:tailEnd type="triangle"/>
+          </a:ln>
+        </p:spPr>
+        <p:style>
+          <a:lnRef idx="1">
+            <a:schemeClr val="dk1"/>
+          </a:lnRef>
+          <a:fillRef idx="0">
+            <a:schemeClr val="dk1"/>
+          </a:fillRef>
+          <a:effectRef idx="0">
+            <a:schemeClr val="dk1"/>
+          </a:effectRef>
+          <a:fontRef idx="minor">
+            <a:schemeClr val="tx1"/>
+          </a:fontRef>
+        </p:style>
+      </p:cxnSp>
+      <p:sp>
+        <p:nvSpPr>
+          <p:cNvPr id="16" name="TextBox 15">
+            <a:extLst>
+              <a:ext uri="{FF2B5EF4-FFF2-40B4-BE49-F238E27FC236}">
+                <a16:creationId xmlns:a16="http://schemas.microsoft.com/office/drawing/2014/main" id="{B944C963-E52D-0D9F-BCA2-AECD07738014}"/>
+              </a:ext>
+            </a:extLst>
+          </p:cNvPr>
+          <p:cNvSpPr txBox="1"/>
+          <p:nvPr/>
+        </p:nvSpPr>
+        <p:spPr>
+          <a:xfrm>
+            <a:off x="3003148" y="2254102"/>
+            <a:ext cx="909223" cy="276999"/>
+          </a:xfrm>
+          <a:prstGeom prst="rect">
+            <a:avLst/>
+          </a:prstGeom>
+          <a:noFill/>
+        </p:spPr>
+        <p:txBody>
+          <a:bodyPr wrap="none" rtlCol="0">
+            <a:spAutoFit/>
+          </a:bodyPr>
+          <a:lstStyle/>
+          <a:p>
+            <a:r>
+              <a:rPr lang="en-US" sz="1200" dirty="0" err="1"/>
+              <a:t>accessCode</a:t>
+            </a:r>
+            <a:endParaRPr lang="en-US" sz="1200" dirty="0"/>
+          </a:p>
+        </p:txBody>
+      </p:sp>
+      <p:sp>
+        <p:nvSpPr>
+          <p:cNvPr id="17" name="TextBox 16">
+            <a:extLst>
+              <a:ext uri="{FF2B5EF4-FFF2-40B4-BE49-F238E27FC236}">
+                <a16:creationId xmlns:a16="http://schemas.microsoft.com/office/drawing/2014/main" id="{210AD4C0-B10A-A694-AEA1-863836EB3163}"/>
+              </a:ext>
+            </a:extLst>
+          </p:cNvPr>
+          <p:cNvSpPr txBox="1"/>
+          <p:nvPr/>
+        </p:nvSpPr>
+        <p:spPr>
+          <a:xfrm>
+            <a:off x="5088488" y="2254102"/>
+            <a:ext cx="689997" cy="276999"/>
+          </a:xfrm>
+          <a:prstGeom prst="rect">
+            <a:avLst/>
+          </a:prstGeom>
+          <a:noFill/>
+        </p:spPr>
+        <p:txBody>
+          <a:bodyPr wrap="none" rtlCol="0">
+            <a:spAutoFit/>
+          </a:bodyPr>
+          <a:lstStyle/>
+          <a:p>
+            <a:r>
+              <a:rPr lang="en-US" sz="1200" dirty="0"/>
+              <a:t>Request</a:t>
+            </a:r>
+          </a:p>
+        </p:txBody>
+      </p:sp>
+      <p:sp>
+        <p:nvSpPr>
+          <p:cNvPr id="18" name="Diamond 17">
+            <a:extLst>
+              <a:ext uri="{FF2B5EF4-FFF2-40B4-BE49-F238E27FC236}">
+                <a16:creationId xmlns:a16="http://schemas.microsoft.com/office/drawing/2014/main" id="{B8794ED8-2615-384B-3B92-92D576A2E34A}"/>
+              </a:ext>
+            </a:extLst>
+          </p:cNvPr>
+          <p:cNvSpPr/>
+          <p:nvPr/>
+        </p:nvSpPr>
+        <p:spPr>
+          <a:xfrm>
+            <a:off x="8459011" y="2136832"/>
+            <a:ext cx="1457983" cy="788538"/>
+          </a:xfrm>
+          <a:prstGeom prst="diamond">
+            <a:avLst/>
+          </a:prstGeom>
+        </p:spPr>
+        <p:style>
+          <a:lnRef idx="2">
+            <a:schemeClr val="dk1"/>
+          </a:lnRef>
+          <a:fillRef idx="1">
+            <a:schemeClr val="lt1"/>
+          </a:fillRef>
+          <a:effectRef idx="0">
+            <a:schemeClr val="dk1"/>
+          </a:effectRef>
+          <a:fontRef idx="minor">
+            <a:schemeClr val="dk1"/>
+          </a:fontRef>
+        </p:style>
+        <p:txBody>
+          <a:bodyPr rtlCol="0" anchor="ctr"/>
+          <a:lstStyle/>
+          <a:p>
+            <a:pPr algn="ctr"/>
+            <a:r>
+              <a:rPr lang="en-US" sz="1100" dirty="0"/>
+              <a:t>Generate verify code</a:t>
+            </a:r>
+          </a:p>
+        </p:txBody>
+      </p:sp>
+      <p:sp>
+        <p:nvSpPr>
+          <p:cNvPr id="19" name="Cylinder 18">
+            <a:extLst>
+              <a:ext uri="{FF2B5EF4-FFF2-40B4-BE49-F238E27FC236}">
+                <a16:creationId xmlns:a16="http://schemas.microsoft.com/office/drawing/2014/main" id="{CF3F0A8F-0346-E9AC-C40C-352E769B49AB}"/>
+              </a:ext>
+            </a:extLst>
+          </p:cNvPr>
+          <p:cNvSpPr/>
+          <p:nvPr/>
+        </p:nvSpPr>
+        <p:spPr>
+          <a:xfrm>
+            <a:off x="8730802" y="3720481"/>
+            <a:ext cx="914400" cy="1216152"/>
+          </a:xfrm>
+          <a:prstGeom prst="can">
+            <a:avLst/>
+          </a:prstGeom>
+        </p:spPr>
+        <p:style>
+          <a:lnRef idx="2">
+            <a:schemeClr val="dk1"/>
+          </a:lnRef>
+          <a:fillRef idx="1">
+            <a:schemeClr val="lt1"/>
+          </a:fillRef>
+          <a:effectRef idx="0">
+            <a:schemeClr val="dk1"/>
+          </a:effectRef>
+          <a:fontRef idx="minor">
+            <a:schemeClr val="dk1"/>
+          </a:fontRef>
+        </p:style>
+        <p:txBody>
+          <a:bodyPr rtlCol="0" anchor="ctr"/>
+          <a:lstStyle/>
+          <a:p>
+            <a:pPr algn="ctr"/>
+            <a:r>
+              <a:rPr lang="en-US" sz="1200" dirty="0"/>
+              <a:t>Database</a:t>
+            </a:r>
+          </a:p>
+        </p:txBody>
+      </p:sp>
+      <p:sp>
+        <p:nvSpPr>
+          <p:cNvPr id="21" name="TextBox 20">
+            <a:extLst>
+              <a:ext uri="{FF2B5EF4-FFF2-40B4-BE49-F238E27FC236}">
+                <a16:creationId xmlns:a16="http://schemas.microsoft.com/office/drawing/2014/main" id="{0F5D51F2-2C4A-B4EE-3EBC-460F92A017D2}"/>
+              </a:ext>
+            </a:extLst>
+          </p:cNvPr>
+          <p:cNvSpPr txBox="1"/>
+          <p:nvPr/>
+        </p:nvSpPr>
+        <p:spPr>
+          <a:xfrm>
+            <a:off x="9263305" y="2935093"/>
+            <a:ext cx="470770" cy="276999"/>
+          </a:xfrm>
+          <a:prstGeom prst="rect">
+            <a:avLst/>
+          </a:prstGeom>
+          <a:noFill/>
+        </p:spPr>
+        <p:txBody>
+          <a:bodyPr wrap="none" rtlCol="0">
+            <a:spAutoFit/>
+          </a:bodyPr>
+          <a:lstStyle/>
+          <a:p>
+            <a:r>
+              <a:rPr lang="en-US" sz="1200" dirty="0"/>
+              <a:t>Save</a:t>
+            </a:r>
+          </a:p>
+        </p:txBody>
+      </p:sp>
+      <p:sp>
+        <p:nvSpPr>
+          <p:cNvPr id="22" name="TextBox 21">
+            <a:extLst>
+              <a:ext uri="{FF2B5EF4-FFF2-40B4-BE49-F238E27FC236}">
+                <a16:creationId xmlns:a16="http://schemas.microsoft.com/office/drawing/2014/main" id="{D87C9A9F-7D6C-AA13-8D2E-E8BA83DB70A8}"/>
+              </a:ext>
+            </a:extLst>
+          </p:cNvPr>
+          <p:cNvSpPr txBox="1"/>
+          <p:nvPr/>
+        </p:nvSpPr>
+        <p:spPr>
+          <a:xfrm>
+            <a:off x="7358058" y="2254102"/>
+            <a:ext cx="689997" cy="276999"/>
+          </a:xfrm>
+          <a:prstGeom prst="rect">
+            <a:avLst/>
+          </a:prstGeom>
+          <a:noFill/>
+        </p:spPr>
+        <p:txBody>
+          <a:bodyPr wrap="none" rtlCol="0">
+            <a:spAutoFit/>
+          </a:bodyPr>
+          <a:lstStyle/>
+          <a:p>
+            <a:r>
+              <a:rPr lang="en-US" sz="1200" dirty="0"/>
+              <a:t>Request</a:t>
+            </a:r>
+          </a:p>
+        </p:txBody>
+      </p:sp>
+      <p:cxnSp>
+        <p:nvCxnSpPr>
+          <p:cNvPr id="25" name="Straight Arrow Connector 24">
+            <a:extLst>
+              <a:ext uri="{FF2B5EF4-FFF2-40B4-BE49-F238E27FC236}">
+                <a16:creationId xmlns:a16="http://schemas.microsoft.com/office/drawing/2014/main" id="{BAC8955E-42DF-A49E-31F8-AB0FA5E729CE}"/>
+              </a:ext>
+            </a:extLst>
+          </p:cNvPr>
+          <p:cNvCxnSpPr>
+            <a:stCxn id="11" idx="3"/>
+            <a:endCxn id="18" idx="1"/>
+          </p:cNvCxnSpPr>
+          <p:nvPr/>
+        </p:nvCxnSpPr>
+        <p:spPr>
+          <a:xfrm>
+            <a:off x="7350268" y="2522440"/>
+            <a:ext cx="1108743" cy="8661"/>
+          </a:xfrm>
+          <a:prstGeom prst="straightConnector1">
+            <a:avLst/>
+          </a:prstGeom>
+          <a:ln>
+            <a:tailEnd type="triangle"/>
+          </a:ln>
+        </p:spPr>
+        <p:style>
+          <a:lnRef idx="1">
+            <a:schemeClr val="dk1"/>
+          </a:lnRef>
+          <a:fillRef idx="0">
+            <a:schemeClr val="dk1"/>
+          </a:fillRef>
+          <a:effectRef idx="0">
+            <a:schemeClr val="dk1"/>
+          </a:effectRef>
+          <a:fontRef idx="minor">
+            <a:schemeClr val="tx1"/>
+          </a:fontRef>
+        </p:style>
+      </p:cxnSp>
+      <p:cxnSp>
+        <p:nvCxnSpPr>
+          <p:cNvPr id="27" name="Straight Arrow Connector 26">
+            <a:extLst>
+              <a:ext uri="{FF2B5EF4-FFF2-40B4-BE49-F238E27FC236}">
+                <a16:creationId xmlns:a16="http://schemas.microsoft.com/office/drawing/2014/main" id="{1CD4AA5C-120B-ADB0-6134-A1C5D44CC874}"/>
+              </a:ext>
+            </a:extLst>
+          </p:cNvPr>
+          <p:cNvCxnSpPr>
+            <a:stCxn id="18" idx="2"/>
+            <a:endCxn id="19" idx="1"/>
+          </p:cNvCxnSpPr>
+          <p:nvPr/>
+        </p:nvCxnSpPr>
+        <p:spPr>
+          <a:xfrm flipH="1">
+            <a:off x="9188002" y="2925370"/>
+            <a:ext cx="1" cy="795111"/>
+          </a:xfrm>
+          <a:prstGeom prst="straightConnector1">
+            <a:avLst/>
+          </a:prstGeom>
+          <a:ln>
+            <a:tailEnd type="triangle"/>
+          </a:ln>
+        </p:spPr>
+        <p:style>
+          <a:lnRef idx="1">
+            <a:schemeClr val="dk1"/>
+          </a:lnRef>
+          <a:fillRef idx="0">
+            <a:schemeClr val="dk1"/>
+          </a:fillRef>
+          <a:effectRef idx="0">
+            <a:schemeClr val="dk1"/>
+          </a:effectRef>
+          <a:fontRef idx="minor">
+            <a:schemeClr val="tx1"/>
+          </a:fontRef>
+        </p:style>
+      </p:cxnSp>
+      <p:cxnSp>
+        <p:nvCxnSpPr>
+          <p:cNvPr id="30" name="Connector: Elbow 29">
+            <a:extLst>
+              <a:ext uri="{FF2B5EF4-FFF2-40B4-BE49-F238E27FC236}">
+                <a16:creationId xmlns:a16="http://schemas.microsoft.com/office/drawing/2014/main" id="{5E00275D-006C-B1B3-31D0-7A83D89E6AFE}"/>
+              </a:ext>
+            </a:extLst>
+          </p:cNvPr>
+          <p:cNvCxnSpPr>
+            <a:stCxn id="18" idx="0"/>
+            <a:endCxn id="11" idx="0"/>
+          </p:cNvCxnSpPr>
+          <p:nvPr/>
+        </p:nvCxnSpPr>
+        <p:spPr>
+          <a:xfrm rot="16200000" flipH="1" flipV="1">
+            <a:off x="7883082" y="939427"/>
+            <a:ext cx="107517" cy="2502325"/>
+          </a:xfrm>
+          <a:prstGeom prst="bentConnector3">
+            <a:avLst>
+              <a:gd name="adj1" fmla="val -475649"/>
+            </a:avLst>
+          </a:prstGeom>
+          <a:ln>
+            <a:tailEnd type="triangle"/>
+          </a:ln>
+        </p:spPr>
+        <p:style>
+          <a:lnRef idx="1">
+            <a:schemeClr val="dk1"/>
+          </a:lnRef>
+          <a:fillRef idx="0">
+            <a:schemeClr val="dk1"/>
+          </a:fillRef>
+          <a:effectRef idx="0">
+            <a:schemeClr val="dk1"/>
+          </a:effectRef>
+          <a:fontRef idx="minor">
+            <a:schemeClr val="tx1"/>
+          </a:fontRef>
+        </p:style>
+      </p:cxnSp>
+      <p:sp>
+        <p:nvSpPr>
+          <p:cNvPr id="32" name="TextBox 31">
+            <a:extLst>
+              <a:ext uri="{FF2B5EF4-FFF2-40B4-BE49-F238E27FC236}">
+                <a16:creationId xmlns:a16="http://schemas.microsoft.com/office/drawing/2014/main" id="{304DF4CE-6B54-2BBF-4A6D-3DFE7568A082}"/>
+              </a:ext>
+            </a:extLst>
+          </p:cNvPr>
+          <p:cNvSpPr txBox="1"/>
+          <p:nvPr/>
+        </p:nvSpPr>
+        <p:spPr>
+          <a:xfrm>
+            <a:off x="7706176" y="1341719"/>
+            <a:ext cx="1505669" cy="276999"/>
+          </a:xfrm>
+          <a:prstGeom prst="rect">
+            <a:avLst/>
+          </a:prstGeom>
+          <a:noFill/>
+        </p:spPr>
+        <p:txBody>
+          <a:bodyPr wrap="none" rtlCol="0">
+            <a:spAutoFit/>
+          </a:bodyPr>
+          <a:lstStyle/>
+          <a:p>
+            <a:r>
+              <a:rPr lang="en-US" sz="1200" dirty="0"/>
+              <a:t>Response </a:t>
+            </a:r>
+            <a:r>
+              <a:rPr lang="en-US" sz="1200" dirty="0" err="1"/>
+              <a:t>verifyCode</a:t>
+            </a:r>
+            <a:endParaRPr lang="en-US" sz="1200" dirty="0"/>
+          </a:p>
+        </p:txBody>
+      </p:sp>
+      <p:cxnSp>
+        <p:nvCxnSpPr>
+          <p:cNvPr id="34" name="Straight Arrow Connector 33">
+            <a:extLst>
+              <a:ext uri="{FF2B5EF4-FFF2-40B4-BE49-F238E27FC236}">
+                <a16:creationId xmlns:a16="http://schemas.microsoft.com/office/drawing/2014/main" id="{CAF9228C-64A3-7ADC-E411-5429E0DF6F6B}"/>
+              </a:ext>
+            </a:extLst>
+          </p:cNvPr>
+          <p:cNvCxnSpPr>
+            <a:stCxn id="11" idx="2"/>
+            <a:endCxn id="2" idx="0"/>
+          </p:cNvCxnSpPr>
+          <p:nvPr/>
+        </p:nvCxnSpPr>
+        <p:spPr>
+          <a:xfrm>
+            <a:off x="6685678" y="2800530"/>
+            <a:ext cx="0" cy="1450192"/>
+          </a:xfrm>
+          <a:prstGeom prst="straightConnector1">
+            <a:avLst/>
+          </a:prstGeom>
+          <a:ln>
+            <a:tailEnd type="triangle"/>
+          </a:ln>
+        </p:spPr>
+        <p:style>
+          <a:lnRef idx="1">
+            <a:schemeClr val="dk1"/>
+          </a:lnRef>
+          <a:fillRef idx="0">
+            <a:schemeClr val="dk1"/>
+          </a:fillRef>
+          <a:effectRef idx="0">
+            <a:schemeClr val="dk1"/>
+          </a:effectRef>
+          <a:fontRef idx="minor">
+            <a:schemeClr val="tx1"/>
+          </a:fontRef>
+        </p:style>
+      </p:cxnSp>
+      <p:sp>
+        <p:nvSpPr>
+          <p:cNvPr id="35" name="TextBox 34">
+            <a:extLst>
+              <a:ext uri="{FF2B5EF4-FFF2-40B4-BE49-F238E27FC236}">
+                <a16:creationId xmlns:a16="http://schemas.microsoft.com/office/drawing/2014/main" id="{1C03FFE7-3221-4706-6EF7-D811AD2C9DAE}"/>
+              </a:ext>
+            </a:extLst>
+          </p:cNvPr>
+          <p:cNvSpPr txBox="1"/>
+          <p:nvPr/>
+        </p:nvSpPr>
+        <p:spPr>
+          <a:xfrm>
+            <a:off x="5839947" y="2837791"/>
+            <a:ext cx="854016" cy="276999"/>
+          </a:xfrm>
+          <a:prstGeom prst="rect">
+            <a:avLst/>
+          </a:prstGeom>
+          <a:noFill/>
+        </p:spPr>
+        <p:txBody>
+          <a:bodyPr wrap="none" rtlCol="0">
+            <a:spAutoFit/>
+          </a:bodyPr>
+          <a:lstStyle/>
+          <a:p>
+            <a:r>
+              <a:rPr lang="en-US" sz="1200" dirty="0" err="1"/>
+              <a:t>verifyCode</a:t>
+            </a:r>
+            <a:endParaRPr lang="en-US" sz="1200" dirty="0"/>
+          </a:p>
+        </p:txBody>
+      </p:sp>
+      <p:sp>
+        <p:nvSpPr>
+          <p:cNvPr id="36" name="Diamond 35">
+            <a:extLst>
+              <a:ext uri="{FF2B5EF4-FFF2-40B4-BE49-F238E27FC236}">
+                <a16:creationId xmlns:a16="http://schemas.microsoft.com/office/drawing/2014/main" id="{882F420E-FBC8-78E9-A506-D62FE4DBBD89}"/>
+              </a:ext>
+            </a:extLst>
+          </p:cNvPr>
+          <p:cNvSpPr/>
+          <p:nvPr/>
+        </p:nvSpPr>
+        <p:spPr>
+          <a:xfrm>
+            <a:off x="3969188" y="4250722"/>
+            <a:ext cx="1215546" cy="556181"/>
+          </a:xfrm>
+          <a:prstGeom prst="diamond">
+            <a:avLst/>
+          </a:prstGeom>
+        </p:spPr>
+        <p:style>
+          <a:lnRef idx="2">
+            <a:schemeClr val="dk1"/>
+          </a:lnRef>
+          <a:fillRef idx="1">
+            <a:schemeClr val="lt1"/>
+          </a:fillRef>
+          <a:effectRef idx="0">
+            <a:schemeClr val="dk1"/>
+          </a:effectRef>
+          <a:fontRef idx="minor">
+            <a:schemeClr val="dk1"/>
+          </a:fontRef>
+        </p:style>
+        <p:txBody>
+          <a:bodyPr rtlCol="0" anchor="ctr"/>
+          <a:lstStyle/>
+          <a:p>
+            <a:pPr algn="ctr"/>
+            <a:r>
+              <a:rPr lang="en-US" sz="1100" dirty="0"/>
+              <a:t>Send mail</a:t>
+            </a:r>
+          </a:p>
+        </p:txBody>
+      </p:sp>
+      <p:cxnSp>
+        <p:nvCxnSpPr>
+          <p:cNvPr id="38" name="Straight Arrow Connector 37">
+            <a:extLst>
+              <a:ext uri="{FF2B5EF4-FFF2-40B4-BE49-F238E27FC236}">
+                <a16:creationId xmlns:a16="http://schemas.microsoft.com/office/drawing/2014/main" id="{8098A468-CCC0-31DF-F9F8-56ACCD88137B}"/>
+              </a:ext>
+            </a:extLst>
+          </p:cNvPr>
+          <p:cNvCxnSpPr>
+            <a:stCxn id="2" idx="1"/>
+            <a:endCxn id="36" idx="3"/>
+          </p:cNvCxnSpPr>
+          <p:nvPr/>
+        </p:nvCxnSpPr>
+        <p:spPr>
+          <a:xfrm flipH="1">
+            <a:off x="5184734" y="4528813"/>
+            <a:ext cx="836354" cy="0"/>
+          </a:xfrm>
+          <a:prstGeom prst="straightConnector1">
+            <a:avLst/>
+          </a:prstGeom>
+          <a:ln>
+            <a:tailEnd type="triangle"/>
+          </a:ln>
+        </p:spPr>
+        <p:style>
+          <a:lnRef idx="1">
+            <a:schemeClr val="dk1"/>
+          </a:lnRef>
+          <a:fillRef idx="0">
+            <a:schemeClr val="dk1"/>
+          </a:fillRef>
+          <a:effectRef idx="0">
+            <a:schemeClr val="dk1"/>
+          </a:effectRef>
+          <a:fontRef idx="minor">
+            <a:schemeClr val="tx1"/>
+          </a:fontRef>
+        </p:style>
+      </p:cxnSp>
+      <p:cxnSp>
+        <p:nvCxnSpPr>
+          <p:cNvPr id="40" name="Connector: Elbow 39">
+            <a:extLst>
+              <a:ext uri="{FF2B5EF4-FFF2-40B4-BE49-F238E27FC236}">
+                <a16:creationId xmlns:a16="http://schemas.microsoft.com/office/drawing/2014/main" id="{E619EEF5-EE92-6329-A31E-08F709FE7B0A}"/>
+              </a:ext>
+            </a:extLst>
+          </p:cNvPr>
+          <p:cNvCxnSpPr>
+            <a:stCxn id="36" idx="1"/>
+          </p:cNvCxnSpPr>
+          <p:nvPr/>
+        </p:nvCxnSpPr>
+        <p:spPr>
+          <a:xfrm rot="10800000">
+            <a:off x="2548222" y="3073593"/>
+            <a:ext cx="1420966" cy="1455221"/>
+          </a:xfrm>
+          <a:prstGeom prst="bentConnector2">
+            <a:avLst/>
+          </a:prstGeom>
+          <a:ln>
+            <a:tailEnd type="triangle"/>
+          </a:ln>
+        </p:spPr>
+        <p:style>
+          <a:lnRef idx="1">
+            <a:schemeClr val="dk1"/>
+          </a:lnRef>
+          <a:fillRef idx="0">
+            <a:schemeClr val="dk1"/>
+          </a:fillRef>
+          <a:effectRef idx="0">
+            <a:schemeClr val="dk1"/>
+          </a:effectRef>
+          <a:fontRef idx="minor">
+            <a:schemeClr val="tx1"/>
+          </a:fontRef>
+        </p:style>
+      </p:cxnSp>
+      <p:sp>
+        <p:nvSpPr>
+          <p:cNvPr id="41" name="TextBox 40">
+            <a:extLst>
+              <a:ext uri="{FF2B5EF4-FFF2-40B4-BE49-F238E27FC236}">
+                <a16:creationId xmlns:a16="http://schemas.microsoft.com/office/drawing/2014/main" id="{A858616B-C221-8204-C86B-29F1B3E4A0C1}"/>
+              </a:ext>
+            </a:extLst>
+          </p:cNvPr>
+          <p:cNvSpPr txBox="1"/>
+          <p:nvPr/>
+        </p:nvSpPr>
+        <p:spPr>
+          <a:xfrm>
+            <a:off x="2771572" y="4580344"/>
+            <a:ext cx="1509644" cy="276999"/>
+          </a:xfrm>
+          <a:prstGeom prst="rect">
+            <a:avLst/>
+          </a:prstGeom>
+          <a:noFill/>
+        </p:spPr>
+        <p:txBody>
+          <a:bodyPr wrap="none" rtlCol="0">
+            <a:spAutoFit/>
+          </a:bodyPr>
+          <a:lstStyle/>
+          <a:p>
+            <a:r>
+              <a:rPr lang="en-US" sz="1200" dirty="0"/>
+              <a:t>Send with </a:t>
+            </a:r>
+            <a:r>
+              <a:rPr lang="en-US" sz="1200" dirty="0" err="1"/>
+              <a:t>verifyCode</a:t>
+            </a:r>
+            <a:endParaRPr lang="en-US" sz="1200" dirty="0"/>
+          </a:p>
+        </p:txBody>
+      </p:sp>
+      <p:sp>
+        <p:nvSpPr>
+          <p:cNvPr id="56" name="TextBox 55">
+            <a:extLst>
+              <a:ext uri="{FF2B5EF4-FFF2-40B4-BE49-F238E27FC236}">
+                <a16:creationId xmlns:a16="http://schemas.microsoft.com/office/drawing/2014/main" id="{98AC62DD-A3C7-5FEB-B73B-5E0752C0DBCE}"/>
+              </a:ext>
+            </a:extLst>
+          </p:cNvPr>
+          <p:cNvSpPr txBox="1"/>
+          <p:nvPr/>
+        </p:nvSpPr>
+        <p:spPr>
+          <a:xfrm>
+            <a:off x="5336793" y="1711612"/>
+            <a:ext cx="865430" cy="276999"/>
+          </a:xfrm>
+          <a:prstGeom prst="rect">
+            <a:avLst/>
+          </a:prstGeom>
+          <a:noFill/>
+        </p:spPr>
+        <p:txBody>
+          <a:bodyPr wrap="none" rtlCol="0">
+            <a:spAutoFit/>
+          </a:bodyPr>
+          <a:lstStyle/>
+          <a:p>
+            <a:r>
+              <a:rPr lang="en-US" sz="1200" dirty="0" err="1"/>
+              <a:t>verifyCode</a:t>
+            </a:r>
+            <a:endParaRPr lang="en-US" sz="1200" dirty="0"/>
+          </a:p>
+        </p:txBody>
+      </p:sp>
+      <p:cxnSp>
+        <p:nvCxnSpPr>
+          <p:cNvPr id="60" name="Connector: Elbow 59">
+            <a:extLst>
+              <a:ext uri="{FF2B5EF4-FFF2-40B4-BE49-F238E27FC236}">
+                <a16:creationId xmlns:a16="http://schemas.microsoft.com/office/drawing/2014/main" id="{26AA0A0B-94A1-3C06-3A81-4C7EB0FCDBB9}"/>
+              </a:ext>
+            </a:extLst>
+          </p:cNvPr>
+          <p:cNvCxnSpPr>
+            <a:cxnSpLocks/>
+          </p:cNvCxnSpPr>
+          <p:nvPr/>
+        </p:nvCxnSpPr>
+        <p:spPr>
+          <a:xfrm rot="16200000" flipH="1">
+            <a:off x="4203850" y="266895"/>
+            <a:ext cx="332839" cy="3635760"/>
+          </a:xfrm>
+          <a:prstGeom prst="bentConnector4">
+            <a:avLst>
+              <a:gd name="adj1" fmla="val -68682"/>
+              <a:gd name="adj2" fmla="val 99912"/>
+            </a:avLst>
+          </a:prstGeom>
+          <a:ln>
+            <a:headEnd type="triangle"/>
+            <a:tailEnd type="triangle"/>
+          </a:ln>
+        </p:spPr>
+        <p:style>
+          <a:lnRef idx="1">
+            <a:schemeClr val="dk1"/>
+          </a:lnRef>
+          <a:fillRef idx="0">
+            <a:schemeClr val="dk1"/>
+          </a:fillRef>
+          <a:effectRef idx="0">
+            <a:schemeClr val="dk1"/>
+          </a:effectRef>
+          <a:fontRef idx="minor">
+            <a:schemeClr val="tx1"/>
+          </a:fontRef>
+        </p:style>
+      </p:cxnSp>
+      <p:sp>
+        <p:nvSpPr>
+          <p:cNvPr id="62" name="TextBox 61">
+            <a:extLst>
+              <a:ext uri="{FF2B5EF4-FFF2-40B4-BE49-F238E27FC236}">
+                <a16:creationId xmlns:a16="http://schemas.microsoft.com/office/drawing/2014/main" id="{7456F596-CF77-0666-D09F-95D083B54715}"/>
+              </a:ext>
+            </a:extLst>
+          </p:cNvPr>
+          <p:cNvSpPr txBox="1"/>
+          <p:nvPr/>
+        </p:nvSpPr>
+        <p:spPr>
+          <a:xfrm>
+            <a:off x="2631397" y="1711613"/>
+            <a:ext cx="783099" cy="276999"/>
+          </a:xfrm>
+          <a:prstGeom prst="rect">
+            <a:avLst/>
+          </a:prstGeom>
+          <a:noFill/>
+        </p:spPr>
+        <p:txBody>
+          <a:bodyPr wrap="none" rtlCol="0">
+            <a:spAutoFit/>
+          </a:bodyPr>
+          <a:lstStyle/>
+          <a:p>
+            <a:r>
+              <a:rPr lang="en-US" sz="1200" dirty="0"/>
+              <a:t>Response</a:t>
+            </a:r>
+          </a:p>
+        </p:txBody>
+      </p:sp>
+      <p:cxnSp>
+        <p:nvCxnSpPr>
+          <p:cNvPr id="80" name="Straight Arrow Connector 79">
+            <a:extLst>
+              <a:ext uri="{FF2B5EF4-FFF2-40B4-BE49-F238E27FC236}">
+                <a16:creationId xmlns:a16="http://schemas.microsoft.com/office/drawing/2014/main" id="{D89779CC-9D69-30BF-D503-42C3B6A0E868}"/>
+              </a:ext>
+            </a:extLst>
+          </p:cNvPr>
+          <p:cNvCxnSpPr/>
+          <p:nvPr/>
+        </p:nvCxnSpPr>
+        <p:spPr>
+          <a:xfrm>
+            <a:off x="7350268" y="2800530"/>
+            <a:ext cx="1380534" cy="1000673"/>
+          </a:xfrm>
+          <a:prstGeom prst="straightConnector1">
+            <a:avLst/>
+          </a:prstGeom>
+          <a:ln>
+            <a:headEnd type="triangle"/>
+            <a:tailEnd type="triangle"/>
+          </a:ln>
+        </p:spPr>
+        <p:style>
+          <a:lnRef idx="1">
+            <a:schemeClr val="dk1"/>
+          </a:lnRef>
+          <a:fillRef idx="0">
+            <a:schemeClr val="dk1"/>
+          </a:fillRef>
+          <a:effectRef idx="0">
+            <a:schemeClr val="dk1"/>
+          </a:effectRef>
+          <a:fontRef idx="minor">
+            <a:schemeClr val="tx1"/>
+          </a:fontRef>
+        </p:style>
+      </p:cxnSp>
+      <p:sp>
+        <p:nvSpPr>
+          <p:cNvPr id="81" name="TextBox 80">
+            <a:extLst>
+              <a:ext uri="{FF2B5EF4-FFF2-40B4-BE49-F238E27FC236}">
+                <a16:creationId xmlns:a16="http://schemas.microsoft.com/office/drawing/2014/main" id="{D378C0E6-F6D9-D42B-A8AC-8DBB14BAD790}"/>
+              </a:ext>
+            </a:extLst>
+          </p:cNvPr>
+          <p:cNvSpPr txBox="1"/>
+          <p:nvPr/>
+        </p:nvSpPr>
+        <p:spPr>
+          <a:xfrm>
+            <a:off x="8138889" y="3720481"/>
+            <a:ext cx="559769" cy="276999"/>
+          </a:xfrm>
+          <a:prstGeom prst="rect">
+            <a:avLst/>
+          </a:prstGeom>
+          <a:noFill/>
+        </p:spPr>
+        <p:txBody>
+          <a:bodyPr wrap="none" rtlCol="0">
+            <a:spAutoFit/>
+          </a:bodyPr>
+          <a:lstStyle/>
+          <a:p>
+            <a:r>
+              <a:rPr lang="en-US" sz="1200" dirty="0"/>
+              <a:t>Check</a:t>
+            </a:r>
+          </a:p>
+        </p:txBody>
+      </p:sp>
+      <p:sp>
+        <p:nvSpPr>
+          <p:cNvPr id="82" name="TextBox 81">
+            <a:extLst>
+              <a:ext uri="{FF2B5EF4-FFF2-40B4-BE49-F238E27FC236}">
+                <a16:creationId xmlns:a16="http://schemas.microsoft.com/office/drawing/2014/main" id="{B1DE2EBC-9D3E-3E89-478D-846AECCE397D}"/>
+              </a:ext>
+            </a:extLst>
+          </p:cNvPr>
+          <p:cNvSpPr txBox="1"/>
+          <p:nvPr/>
+        </p:nvSpPr>
+        <p:spPr>
+          <a:xfrm>
+            <a:off x="7509674" y="2713114"/>
+            <a:ext cx="783099" cy="276999"/>
+          </a:xfrm>
+          <a:prstGeom prst="rect">
+            <a:avLst/>
+          </a:prstGeom>
+          <a:noFill/>
+        </p:spPr>
+        <p:txBody>
+          <a:bodyPr wrap="none" rtlCol="0">
+            <a:spAutoFit/>
+          </a:bodyPr>
+          <a:lstStyle/>
+          <a:p>
+            <a:r>
+              <a:rPr lang="en-US" sz="1200" dirty="0"/>
+              <a:t>Response</a:t>
+            </a:r>
+          </a:p>
+        </p:txBody>
+      </p:sp>
+      <p:sp>
+        <p:nvSpPr>
+          <p:cNvPr id="83" name="TextBox 82">
+            <a:extLst>
+              <a:ext uri="{FF2B5EF4-FFF2-40B4-BE49-F238E27FC236}">
+                <a16:creationId xmlns:a16="http://schemas.microsoft.com/office/drawing/2014/main" id="{AF0C5978-26E6-AD25-76F9-7A45D37571EB}"/>
+              </a:ext>
+            </a:extLst>
+          </p:cNvPr>
+          <p:cNvSpPr txBox="1"/>
+          <p:nvPr/>
+        </p:nvSpPr>
+        <p:spPr>
+          <a:xfrm>
+            <a:off x="3224830" y="5783361"/>
+            <a:ext cx="5742341" cy="369332"/>
+          </a:xfrm>
+          <a:prstGeom prst="rect">
+            <a:avLst/>
+          </a:prstGeom>
+          <a:noFill/>
+        </p:spPr>
+        <p:txBody>
+          <a:bodyPr wrap="none" rtlCol="0">
+            <a:spAutoFit/>
+          </a:bodyPr>
+          <a:lstStyle/>
+          <a:p>
+            <a:r>
+              <a:rPr lang="en-US" dirty="0"/>
+              <a:t>Access and send verify code to the User (Send Mail service)</a:t>
+            </a:r>
+          </a:p>
+        </p:txBody>
+      </p:sp>
     </p:spTree>
     <p:extLst>
       <p:ext uri="{BB962C8B-B14F-4D97-AF65-F5344CB8AC3E}">

</xml_diff>